<commit_message>
Deployed 1c039e0 with MkDocs version: 1.6.0
</commit_message>
<xml_diff>
--- a/material/Deep Learning.pptx
+++ b/material/Deep Learning.pptx
@@ -5,10 +5,10 @@
     <p:sldMasterId id="2147483648" r:id="rId1"/>
   </p:sldMasterIdLst>
   <p:notesMasterIdLst>
-    <p:notesMasterId r:id="rId16"/>
+    <p:notesMasterId r:id="rId19"/>
   </p:notesMasterIdLst>
   <p:handoutMasterIdLst>
-    <p:handoutMasterId r:id="rId17"/>
+    <p:handoutMasterId r:id="rId20"/>
   </p:handoutMasterIdLst>
   <p:sldIdLst>
     <p:sldId id="256" r:id="rId2"/>
@@ -23,8 +23,11 @@
     <p:sldId id="269" r:id="rId11"/>
     <p:sldId id="270" r:id="rId12"/>
     <p:sldId id="271" r:id="rId13"/>
-    <p:sldId id="260" r:id="rId14"/>
-    <p:sldId id="262" r:id="rId15"/>
+    <p:sldId id="272" r:id="rId14"/>
+    <p:sldId id="273" r:id="rId15"/>
+    <p:sldId id="274" r:id="rId16"/>
+    <p:sldId id="260" r:id="rId17"/>
+    <p:sldId id="262" r:id="rId18"/>
   </p:sldIdLst>
   <p:sldSz cx="12192000" cy="6858000"/>
   <p:notesSz cx="6858000" cy="9144000"/>
@@ -819,7 +822,7 @@
               <a:t>灰線真實環境</a:t>
             </a:r>
             <a:r>
-              <a:rPr lang="en-US" altLang="zh-TW"/>
+              <a:rPr lang="en-US" altLang="zh-TW" dirty="0"/>
               <a:t> f^</a:t>
             </a:r>
             <a:endParaRPr lang="en-TW" dirty="0"/>
@@ -6338,6 +6341,2462 @@
           <p:cNvPr id="2" name="Title 1">
             <a:extLst>
               <a:ext uri="{FF2B5EF4-FFF2-40B4-BE49-F238E27FC236}">
+                <a16:creationId xmlns:a16="http://schemas.microsoft.com/office/drawing/2014/main" id="{2B6822A7-D6CA-7F37-1482-5A3DE4937E4D}"/>
+              </a:ext>
+            </a:extLst>
+          </p:cNvPr>
+          <p:cNvSpPr>
+            <a:spLocks noGrp="1"/>
+          </p:cNvSpPr>
+          <p:nvPr>
+            <p:ph type="title"/>
+          </p:nvPr>
+        </p:nvSpPr>
+        <p:spPr/>
+        <p:txBody>
+          <a:bodyPr/>
+          <a:lstStyle/>
+          <a:p>
+            <a:endParaRPr lang="en-TW"/>
+          </a:p>
+        </p:txBody>
+      </p:sp>
+      <p:pic>
+        <p:nvPicPr>
+          <p:cNvPr id="5" name="Content Placeholder 4">
+            <a:extLst>
+              <a:ext uri="{FF2B5EF4-FFF2-40B4-BE49-F238E27FC236}">
+                <a16:creationId xmlns:a16="http://schemas.microsoft.com/office/drawing/2014/main" id="{2B9D794C-16D5-1EC2-4130-C3842F225897}"/>
+              </a:ext>
+            </a:extLst>
+          </p:cNvPr>
+          <p:cNvPicPr>
+            <a:picLocks noGrp="1" noChangeAspect="1"/>
+          </p:cNvPicPr>
+          <p:nvPr>
+            <p:ph idx="1"/>
+          </p:nvPr>
+        </p:nvPicPr>
+        <p:blipFill>
+          <a:blip r:embed="rId2">
+            <a:extLst>
+              <a:ext uri="{28A0092B-C50C-407E-A947-70E740481C1C}">
+                <a14:useLocalDpi xmlns:a14="http://schemas.microsoft.com/office/drawing/2010/main" val="0"/>
+              </a:ext>
+            </a:extLst>
+          </a:blip>
+          <a:stretch>
+            <a:fillRect/>
+          </a:stretch>
+        </p:blipFill>
+        <p:spPr>
+          <a:xfrm>
+            <a:off x="838200" y="2045914"/>
+            <a:ext cx="10515600" cy="3278934"/>
+          </a:xfrm>
+        </p:spPr>
+      </p:pic>
+      <p:sp>
+        <p:nvSpPr>
+          <p:cNvPr id="7" name="TextBox 6">
+            <a:extLst>
+              <a:ext uri="{FF2B5EF4-FFF2-40B4-BE49-F238E27FC236}">
+                <a16:creationId xmlns:a16="http://schemas.microsoft.com/office/drawing/2014/main" id="{E8D3488B-9787-9467-7A72-253900E9152D}"/>
+              </a:ext>
+            </a:extLst>
+          </p:cNvPr>
+          <p:cNvSpPr txBox="1"/>
+          <p:nvPr/>
+        </p:nvSpPr>
+        <p:spPr>
+          <a:xfrm>
+            <a:off x="5844209" y="1861248"/>
+            <a:ext cx="2054087" cy="369332"/>
+          </a:xfrm>
+          <a:prstGeom prst="rect">
+            <a:avLst/>
+          </a:prstGeom>
+          <a:noFill/>
+        </p:spPr>
+        <p:txBody>
+          <a:bodyPr wrap="square">
+            <a:spAutoFit/>
+          </a:bodyPr>
+          <a:lstStyle/>
+          <a:p>
+            <a:r>
+              <a:rPr lang="en-US" b="0" i="0" dirty="0">
+                <a:solidFill>
+                  <a:srgbClr val="FF0000"/>
+                </a:solidFill>
+                <a:effectLst/>
+                <a:latin typeface="Roboto" panose="02000000000000000000" pitchFamily="2" charset="0"/>
+              </a:rPr>
+              <a:t>Public Testing Set</a:t>
+            </a:r>
+            <a:endParaRPr lang="en-TW" dirty="0">
+              <a:solidFill>
+                <a:srgbClr val="FF0000"/>
+              </a:solidFill>
+            </a:endParaRPr>
+          </a:p>
+        </p:txBody>
+      </p:sp>
+      <p:sp>
+        <p:nvSpPr>
+          <p:cNvPr id="8" name="TextBox 7">
+            <a:extLst>
+              <a:ext uri="{FF2B5EF4-FFF2-40B4-BE49-F238E27FC236}">
+                <a16:creationId xmlns:a16="http://schemas.microsoft.com/office/drawing/2014/main" id="{93BC74AA-136E-9E60-B0E9-38F9D8F71501}"/>
+              </a:ext>
+            </a:extLst>
+          </p:cNvPr>
+          <p:cNvSpPr txBox="1"/>
+          <p:nvPr/>
+        </p:nvSpPr>
+        <p:spPr>
+          <a:xfrm>
+            <a:off x="8572500" y="1861248"/>
+            <a:ext cx="2201518" cy="369332"/>
+          </a:xfrm>
+          <a:prstGeom prst="rect">
+            <a:avLst/>
+          </a:prstGeom>
+          <a:noFill/>
+        </p:spPr>
+        <p:txBody>
+          <a:bodyPr wrap="square">
+            <a:spAutoFit/>
+          </a:bodyPr>
+          <a:lstStyle/>
+          <a:p>
+            <a:r>
+              <a:rPr lang="en-US" b="0" i="0" dirty="0">
+                <a:solidFill>
+                  <a:srgbClr val="FF0000"/>
+                </a:solidFill>
+                <a:effectLst/>
+                <a:latin typeface="Roboto" panose="02000000000000000000" pitchFamily="2" charset="0"/>
+              </a:rPr>
+              <a:t>Private Testing Set</a:t>
+            </a:r>
+            <a:endParaRPr lang="en-TW" dirty="0">
+              <a:solidFill>
+                <a:srgbClr val="FF0000"/>
+              </a:solidFill>
+            </a:endParaRPr>
+          </a:p>
+        </p:txBody>
+      </p:sp>
+    </p:spTree>
+    <p:extLst>
+      <p:ext uri="{BB962C8B-B14F-4D97-AF65-F5344CB8AC3E}">
+        <p14:creationId xmlns:p14="http://schemas.microsoft.com/office/powerpoint/2010/main" val="1922632786"/>
+      </p:ext>
+    </p:extLst>
+  </p:cSld>
+  <p:clrMapOvr>
+    <a:masterClrMapping/>
+  </p:clrMapOvr>
+</p:sld>
+</file>
+
+<file path=ppt/slides/slide14.xml><?xml version="1.0" encoding="utf-8"?>
+<p:sld xmlns:a="http://schemas.openxmlformats.org/drawingml/2006/main" xmlns:r="http://schemas.openxmlformats.org/officeDocument/2006/relationships" xmlns:p="http://schemas.openxmlformats.org/presentationml/2006/main">
+  <p:cSld>
+    <p:spTree>
+      <p:nvGrpSpPr>
+        <p:cNvPr id="1" name=""/>
+        <p:cNvGrpSpPr/>
+        <p:nvPr/>
+      </p:nvGrpSpPr>
+      <p:grpSpPr>
+        <a:xfrm>
+          <a:off x="0" y="0"/>
+          <a:ext cx="0" cy="0"/>
+          <a:chOff x="0" y="0"/>
+          <a:chExt cx="0" cy="0"/>
+        </a:xfrm>
+      </p:grpSpPr>
+      <p:sp>
+        <p:nvSpPr>
+          <p:cNvPr id="2" name="Title 1">
+            <a:extLst>
+              <a:ext uri="{FF2B5EF4-FFF2-40B4-BE49-F238E27FC236}">
+                <a16:creationId xmlns:a16="http://schemas.microsoft.com/office/drawing/2014/main" id="{129D0783-0000-601D-3535-3898E5D4AAFE}"/>
+              </a:ext>
+            </a:extLst>
+          </p:cNvPr>
+          <p:cNvSpPr>
+            <a:spLocks noGrp="1"/>
+          </p:cNvSpPr>
+          <p:nvPr>
+            <p:ph type="title"/>
+          </p:nvPr>
+        </p:nvSpPr>
+        <p:spPr/>
+        <p:txBody>
+          <a:bodyPr/>
+          <a:lstStyle/>
+          <a:p>
+            <a:endParaRPr lang="en-TW"/>
+          </a:p>
+        </p:txBody>
+      </p:sp>
+      <p:grpSp>
+        <p:nvGrpSpPr>
+          <p:cNvPr id="4" name="Group 3">
+            <a:extLst>
+              <a:ext uri="{FF2B5EF4-FFF2-40B4-BE49-F238E27FC236}">
+                <a16:creationId xmlns:a16="http://schemas.microsoft.com/office/drawing/2014/main" id="{1F57296F-D1BD-4CDA-331A-20D4A5B08A24}"/>
+              </a:ext>
+            </a:extLst>
+          </p:cNvPr>
+          <p:cNvGrpSpPr/>
+          <p:nvPr/>
+        </p:nvGrpSpPr>
+        <p:grpSpPr>
+          <a:xfrm>
+            <a:off x="159025" y="1772091"/>
+            <a:ext cx="6597800" cy="951230"/>
+            <a:chOff x="3048000" y="725170"/>
+            <a:chExt cx="6597800" cy="951230"/>
+          </a:xfrm>
+        </p:grpSpPr>
+        <p:sp>
+          <p:nvSpPr>
+            <p:cNvPr id="5" name="Rectangle 4">
+              <a:extLst>
+                <a:ext uri="{FF2B5EF4-FFF2-40B4-BE49-F238E27FC236}">
+                  <a16:creationId xmlns:a16="http://schemas.microsoft.com/office/drawing/2014/main" id="{13F12397-731C-E839-AC0D-C3057BD2EB5F}"/>
+                </a:ext>
+              </a:extLst>
+            </p:cNvPr>
+            <p:cNvSpPr/>
+            <p:nvPr/>
+          </p:nvSpPr>
+          <p:spPr>
+            <a:xfrm>
+              <a:off x="3048000" y="1282700"/>
+              <a:ext cx="5118100" cy="393700"/>
+            </a:xfrm>
+            <a:prstGeom prst="rect">
+              <a:avLst/>
+            </a:prstGeom>
+            <a:solidFill>
+              <a:schemeClr val="accent1"/>
+            </a:solidFill>
+            <a:ln w="25400">
+              <a:solidFill>
+                <a:schemeClr val="accent1"/>
+              </a:solidFill>
+            </a:ln>
+          </p:spPr>
+          <p:style>
+            <a:lnRef idx="2">
+              <a:schemeClr val="accent1">
+                <a:shade val="50000"/>
+              </a:schemeClr>
+            </a:lnRef>
+            <a:fillRef idx="1">
+              <a:schemeClr val="accent1"/>
+            </a:fillRef>
+            <a:effectRef idx="0">
+              <a:schemeClr val="accent1"/>
+            </a:effectRef>
+            <a:fontRef idx="minor">
+              <a:schemeClr val="lt1"/>
+            </a:fontRef>
+          </p:style>
+          <p:txBody>
+            <a:bodyPr rtlCol="0" anchor="ctr"/>
+            <a:lstStyle/>
+            <a:p>
+              <a:pPr algn="ctr"/>
+              <a:r>
+                <a:rPr lang="en-TW" dirty="0">
+                  <a:solidFill>
+                    <a:schemeClr val="bg1"/>
+                  </a:solidFill>
+                </a:rPr>
+                <a:t>Training data</a:t>
+              </a:r>
+            </a:p>
+          </p:txBody>
+        </p:sp>
+        <p:sp>
+          <p:nvSpPr>
+            <p:cNvPr id="6" name="Rectangle 5">
+              <a:extLst>
+                <a:ext uri="{FF2B5EF4-FFF2-40B4-BE49-F238E27FC236}">
+                  <a16:creationId xmlns:a16="http://schemas.microsoft.com/office/drawing/2014/main" id="{8B0BA4C2-E477-0E13-AFDD-332EBE53F8DF}"/>
+                </a:ext>
+              </a:extLst>
+            </p:cNvPr>
+            <p:cNvSpPr/>
+            <p:nvPr/>
+          </p:nvSpPr>
+          <p:spPr>
+            <a:xfrm>
+              <a:off x="3048000" y="725170"/>
+              <a:ext cx="6584954" cy="393700"/>
+            </a:xfrm>
+            <a:prstGeom prst="rect">
+              <a:avLst/>
+            </a:prstGeom>
+            <a:ln/>
+          </p:spPr>
+          <p:style>
+            <a:lnRef idx="3">
+              <a:schemeClr val="lt1"/>
+            </a:lnRef>
+            <a:fillRef idx="1">
+              <a:schemeClr val="accent3"/>
+            </a:fillRef>
+            <a:effectRef idx="1">
+              <a:schemeClr val="accent3"/>
+            </a:effectRef>
+            <a:fontRef idx="minor">
+              <a:schemeClr val="lt1"/>
+            </a:fontRef>
+          </p:style>
+          <p:txBody>
+            <a:bodyPr rtlCol="0" anchor="ctr"/>
+            <a:lstStyle/>
+            <a:p>
+              <a:pPr algn="ctr"/>
+              <a:r>
+                <a:rPr lang="en-TW" dirty="0">
+                  <a:solidFill>
+                    <a:schemeClr val="tx1"/>
+                  </a:solidFill>
+                </a:rPr>
+                <a:t>Dataset</a:t>
+              </a:r>
+            </a:p>
+          </p:txBody>
+        </p:sp>
+        <p:sp>
+          <p:nvSpPr>
+            <p:cNvPr id="7" name="Rectangle 6">
+              <a:extLst>
+                <a:ext uri="{FF2B5EF4-FFF2-40B4-BE49-F238E27FC236}">
+                  <a16:creationId xmlns:a16="http://schemas.microsoft.com/office/drawing/2014/main" id="{79784943-F48A-787B-5247-41173184FCFB}"/>
+                </a:ext>
+              </a:extLst>
+            </p:cNvPr>
+            <p:cNvSpPr/>
+            <p:nvPr/>
+          </p:nvSpPr>
+          <p:spPr>
+            <a:xfrm>
+              <a:off x="8166100" y="1282700"/>
+              <a:ext cx="1479700" cy="393700"/>
+            </a:xfrm>
+            <a:prstGeom prst="rect">
+              <a:avLst/>
+            </a:prstGeom>
+            <a:solidFill>
+              <a:schemeClr val="accent4"/>
+            </a:solidFill>
+            <a:ln w="25400">
+              <a:solidFill>
+                <a:schemeClr val="accent4"/>
+              </a:solidFill>
+            </a:ln>
+          </p:spPr>
+          <p:style>
+            <a:lnRef idx="2">
+              <a:schemeClr val="accent1">
+                <a:shade val="50000"/>
+              </a:schemeClr>
+            </a:lnRef>
+            <a:fillRef idx="1">
+              <a:schemeClr val="accent1"/>
+            </a:fillRef>
+            <a:effectRef idx="0">
+              <a:schemeClr val="accent1"/>
+            </a:effectRef>
+            <a:fontRef idx="minor">
+              <a:schemeClr val="lt1"/>
+            </a:fontRef>
+          </p:style>
+          <p:txBody>
+            <a:bodyPr rtlCol="0" anchor="ctr"/>
+            <a:lstStyle/>
+            <a:p>
+              <a:pPr algn="ctr"/>
+              <a:r>
+                <a:rPr lang="en-TW" dirty="0">
+                  <a:solidFill>
+                    <a:schemeClr val="bg1"/>
+                  </a:solidFill>
+                </a:rPr>
+                <a:t>Testing data</a:t>
+              </a:r>
+            </a:p>
+          </p:txBody>
+        </p:sp>
+      </p:grpSp>
+      <p:cxnSp>
+        <p:nvCxnSpPr>
+          <p:cNvPr id="11" name="Straight Arrow Connector 10">
+            <a:extLst>
+              <a:ext uri="{FF2B5EF4-FFF2-40B4-BE49-F238E27FC236}">
+                <a16:creationId xmlns:a16="http://schemas.microsoft.com/office/drawing/2014/main" id="{0DD093FB-FCD0-152B-852C-BED9E2921E1C}"/>
+              </a:ext>
+            </a:extLst>
+          </p:cNvPr>
+          <p:cNvCxnSpPr/>
+          <p:nvPr/>
+        </p:nvCxnSpPr>
+        <p:spPr>
+          <a:xfrm>
+            <a:off x="2688329" y="2753013"/>
+            <a:ext cx="0" cy="596900"/>
+          </a:xfrm>
+          <a:prstGeom prst="straightConnector1">
+            <a:avLst/>
+          </a:prstGeom>
+          <a:ln>
+            <a:tailEnd type="triangle"/>
+          </a:ln>
+        </p:spPr>
+        <p:style>
+          <a:lnRef idx="1">
+            <a:schemeClr val="dk1"/>
+          </a:lnRef>
+          <a:fillRef idx="0">
+            <a:schemeClr val="dk1"/>
+          </a:fillRef>
+          <a:effectRef idx="0">
+            <a:schemeClr val="dk1"/>
+          </a:effectRef>
+          <a:fontRef idx="minor">
+            <a:schemeClr val="tx1"/>
+          </a:fontRef>
+        </p:style>
+      </p:cxnSp>
+      <p:cxnSp>
+        <p:nvCxnSpPr>
+          <p:cNvPr id="12" name="Straight Arrow Connector 11">
+            <a:extLst>
+              <a:ext uri="{FF2B5EF4-FFF2-40B4-BE49-F238E27FC236}">
+                <a16:creationId xmlns:a16="http://schemas.microsoft.com/office/drawing/2014/main" id="{45765463-5177-091C-BBF7-55A99DA34743}"/>
+              </a:ext>
+            </a:extLst>
+          </p:cNvPr>
+          <p:cNvCxnSpPr/>
+          <p:nvPr/>
+        </p:nvCxnSpPr>
+        <p:spPr>
+          <a:xfrm>
+            <a:off x="6007447" y="2723321"/>
+            <a:ext cx="0" cy="596900"/>
+          </a:xfrm>
+          <a:prstGeom prst="straightConnector1">
+            <a:avLst/>
+          </a:prstGeom>
+          <a:ln>
+            <a:tailEnd type="triangle"/>
+          </a:ln>
+        </p:spPr>
+        <p:style>
+          <a:lnRef idx="1">
+            <a:schemeClr val="dk1"/>
+          </a:lnRef>
+          <a:fillRef idx="0">
+            <a:schemeClr val="dk1"/>
+          </a:fillRef>
+          <a:effectRef idx="0">
+            <a:schemeClr val="dk1"/>
+          </a:effectRef>
+          <a:fontRef idx="minor">
+            <a:schemeClr val="tx1"/>
+          </a:fontRef>
+        </p:style>
+      </p:cxnSp>
+      <p:sp>
+        <p:nvSpPr>
+          <p:cNvPr id="13" name="Rectangle 12">
+            <a:extLst>
+              <a:ext uri="{FF2B5EF4-FFF2-40B4-BE49-F238E27FC236}">
+                <a16:creationId xmlns:a16="http://schemas.microsoft.com/office/drawing/2014/main" id="{C891DEE1-AF9B-32F6-5B1D-980868E164CD}"/>
+              </a:ext>
+            </a:extLst>
+          </p:cNvPr>
+          <p:cNvSpPr/>
+          <p:nvPr/>
+        </p:nvSpPr>
+        <p:spPr>
+          <a:xfrm>
+            <a:off x="1986793" y="3446432"/>
+            <a:ext cx="1415772" cy="338554"/>
+          </a:xfrm>
+          <a:prstGeom prst="rect">
+            <a:avLst/>
+          </a:prstGeom>
+        </p:spPr>
+        <p:txBody>
+          <a:bodyPr wrap="none">
+            <a:spAutoFit/>
+          </a:bodyPr>
+          <a:lstStyle/>
+          <a:p>
+            <a:r>
+              <a:rPr lang="en-TW" sz="1600" b="1" dirty="0"/>
+              <a:t>實際訓練模型</a:t>
+            </a:r>
+          </a:p>
+        </p:txBody>
+      </p:sp>
+      <p:sp>
+        <p:nvSpPr>
+          <p:cNvPr id="14" name="Rectangle 13">
+            <a:extLst>
+              <a:ext uri="{FF2B5EF4-FFF2-40B4-BE49-F238E27FC236}">
+                <a16:creationId xmlns:a16="http://schemas.microsoft.com/office/drawing/2014/main" id="{B3AC0532-2DE7-051F-3844-025C67DB0A20}"/>
+              </a:ext>
+            </a:extLst>
+          </p:cNvPr>
+          <p:cNvSpPr/>
+          <p:nvPr/>
+        </p:nvSpPr>
+        <p:spPr>
+          <a:xfrm>
+            <a:off x="5463849" y="3416740"/>
+            <a:ext cx="1415772" cy="584775"/>
+          </a:xfrm>
+          <a:prstGeom prst="rect">
+            <a:avLst/>
+          </a:prstGeom>
+        </p:spPr>
+        <p:txBody>
+          <a:bodyPr wrap="none">
+            <a:spAutoFit/>
+          </a:bodyPr>
+          <a:lstStyle/>
+          <a:p>
+            <a:r>
+              <a:rPr lang="en-TW" sz="1600" b="1" dirty="0"/>
+              <a:t>用來評估最終</a:t>
+            </a:r>
+          </a:p>
+          <a:p>
+            <a:r>
+              <a:rPr lang="en-TW" sz="1600" b="1" dirty="0"/>
+              <a:t>選擇的模型</a:t>
+            </a:r>
+          </a:p>
+        </p:txBody>
+      </p:sp>
+      <p:sp>
+        <p:nvSpPr>
+          <p:cNvPr id="15" name="Rectangle 14">
+            <a:extLst>
+              <a:ext uri="{FF2B5EF4-FFF2-40B4-BE49-F238E27FC236}">
+                <a16:creationId xmlns:a16="http://schemas.microsoft.com/office/drawing/2014/main" id="{687A57A8-F068-9F2A-167E-AFE14446A55E}"/>
+              </a:ext>
+            </a:extLst>
+          </p:cNvPr>
+          <p:cNvSpPr/>
+          <p:nvPr/>
+        </p:nvSpPr>
+        <p:spPr>
+          <a:xfrm>
+            <a:off x="159025" y="4739049"/>
+            <a:ext cx="6584953" cy="393700"/>
+          </a:xfrm>
+          <a:prstGeom prst="rect">
+            <a:avLst/>
+          </a:prstGeom>
+          <a:solidFill>
+            <a:schemeClr val="accent1"/>
+          </a:solidFill>
+          <a:ln w="25400">
+            <a:solidFill>
+              <a:schemeClr val="accent1"/>
+            </a:solidFill>
+          </a:ln>
+        </p:spPr>
+        <p:style>
+          <a:lnRef idx="2">
+            <a:schemeClr val="accent1">
+              <a:shade val="50000"/>
+            </a:schemeClr>
+          </a:lnRef>
+          <a:fillRef idx="1">
+            <a:schemeClr val="accent1"/>
+          </a:fillRef>
+          <a:effectRef idx="0">
+            <a:schemeClr val="accent1"/>
+          </a:effectRef>
+          <a:fontRef idx="minor">
+            <a:schemeClr val="lt1"/>
+          </a:fontRef>
+        </p:style>
+        <p:txBody>
+          <a:bodyPr rtlCol="0" anchor="ctr"/>
+          <a:lstStyle/>
+          <a:p>
+            <a:pPr algn="ctr"/>
+            <a:r>
+              <a:rPr lang="en-TW" dirty="0">
+                <a:solidFill>
+                  <a:schemeClr val="bg1"/>
+                </a:solidFill>
+              </a:rPr>
+              <a:t>Training data</a:t>
+            </a:r>
+          </a:p>
+        </p:txBody>
+      </p:sp>
+      <p:pic>
+        <p:nvPicPr>
+          <p:cNvPr id="16" name="Picture 8">
+            <a:extLst>
+              <a:ext uri="{FF2B5EF4-FFF2-40B4-BE49-F238E27FC236}">
+                <a16:creationId xmlns:a16="http://schemas.microsoft.com/office/drawing/2014/main" id="{43B832A1-66A2-97E8-9138-9596F3A17B08}"/>
+              </a:ext>
+            </a:extLst>
+          </p:cNvPr>
+          <p:cNvPicPr>
+            <a:picLocks noChangeAspect="1" noChangeArrowheads="1"/>
+          </p:cNvPicPr>
+          <p:nvPr/>
+        </p:nvPicPr>
+        <p:blipFill>
+          <a:blip r:embed="rId2">
+            <a:extLst>
+              <a:ext uri="{28A0092B-C50C-407E-A947-70E740481C1C}">
+                <a14:useLocalDpi xmlns:a14="http://schemas.microsoft.com/office/drawing/2010/main" val="0"/>
+              </a:ext>
+            </a:extLst>
+          </a:blip>
+          <a:srcRect/>
+          <a:stretch/>
+        </p:blipFill>
+        <p:spPr bwMode="auto">
+          <a:xfrm>
+            <a:off x="7966511" y="2799285"/>
+            <a:ext cx="1186843" cy="1186843"/>
+          </a:xfrm>
+          <a:prstGeom prst="rect">
+            <a:avLst/>
+          </a:prstGeom>
+          <a:noFill/>
+          <a:extLst>
+            <a:ext uri="{909E8E84-426E-40DD-AFC4-6F175D3DCCD1}">
+              <a14:hiddenFill xmlns:a14="http://schemas.microsoft.com/office/drawing/2010/main">
+                <a:solidFill>
+                  <a:srgbClr val="FFFFFF"/>
+                </a:solidFill>
+              </a14:hiddenFill>
+            </a:ext>
+          </a:extLst>
+        </p:spPr>
+      </p:pic>
+      <p:sp>
+        <p:nvSpPr>
+          <p:cNvPr id="18" name="TextBox 17">
+            <a:extLst>
+              <a:ext uri="{FF2B5EF4-FFF2-40B4-BE49-F238E27FC236}">
+                <a16:creationId xmlns:a16="http://schemas.microsoft.com/office/drawing/2014/main" id="{8D244B92-5A38-CB40-E726-964AC6833C4E}"/>
+              </a:ext>
+            </a:extLst>
+          </p:cNvPr>
+          <p:cNvSpPr txBox="1"/>
+          <p:nvPr/>
+        </p:nvSpPr>
+        <p:spPr>
+          <a:xfrm>
+            <a:off x="7427392" y="2507827"/>
+            <a:ext cx="2265080" cy="369332"/>
+          </a:xfrm>
+          <a:prstGeom prst="rect">
+            <a:avLst/>
+          </a:prstGeom>
+          <a:noFill/>
+        </p:spPr>
+        <p:txBody>
+          <a:bodyPr wrap="square">
+            <a:spAutoFit/>
+          </a:bodyPr>
+          <a:lstStyle/>
+          <a:p>
+            <a:r>
+              <a:rPr lang="zh-TW" altLang="en-US" b="0" i="0" dirty="0">
+                <a:effectLst/>
+                <a:latin typeface="Microsoft JhengHei" panose="020B0604030504040204" pitchFamily="34" charset="-120"/>
+                <a:ea typeface="Microsoft JhengHei" panose="020B0604030504040204" pitchFamily="34" charset="-120"/>
+              </a:rPr>
+              <a:t>表現較佳的模型架構</a:t>
+            </a:r>
+            <a:endParaRPr lang="en-TW" dirty="0">
+              <a:latin typeface="Microsoft JhengHei" panose="020B0604030504040204" pitchFamily="34" charset="-120"/>
+              <a:ea typeface="Microsoft JhengHei" panose="020B0604030504040204" pitchFamily="34" charset="-120"/>
+            </a:endParaRPr>
+          </a:p>
+        </p:txBody>
+      </p:sp>
+      <p:sp>
+        <p:nvSpPr>
+          <p:cNvPr id="19" name="Left Brace 18">
+            <a:extLst>
+              <a:ext uri="{FF2B5EF4-FFF2-40B4-BE49-F238E27FC236}">
+                <a16:creationId xmlns:a16="http://schemas.microsoft.com/office/drawing/2014/main" id="{89F463F9-F6B6-B6CC-D43F-E39DD38EF5BF}"/>
+              </a:ext>
+            </a:extLst>
+          </p:cNvPr>
+          <p:cNvSpPr/>
+          <p:nvPr/>
+        </p:nvSpPr>
+        <p:spPr>
+          <a:xfrm rot="10800000">
+            <a:off x="6978078" y="2413373"/>
+            <a:ext cx="317500" cy="1460500"/>
+          </a:xfrm>
+          <a:prstGeom prst="leftBrace">
+            <a:avLst>
+              <a:gd name="adj1" fmla="val 24333"/>
+              <a:gd name="adj2" fmla="val 50000"/>
+            </a:avLst>
+          </a:prstGeom>
+          <a:ln>
+            <a:prstDash val="lgDash"/>
+          </a:ln>
+        </p:spPr>
+        <p:style>
+          <a:lnRef idx="1">
+            <a:schemeClr val="dk1"/>
+          </a:lnRef>
+          <a:fillRef idx="0">
+            <a:schemeClr val="dk1"/>
+          </a:fillRef>
+          <a:effectRef idx="0">
+            <a:schemeClr val="dk1"/>
+          </a:effectRef>
+          <a:fontRef idx="minor">
+            <a:schemeClr val="tx1"/>
+          </a:fontRef>
+        </p:style>
+        <p:txBody>
+          <a:bodyPr rtlCol="0" anchor="ctr"/>
+          <a:lstStyle/>
+          <a:p>
+            <a:pPr algn="ctr"/>
+            <a:endParaRPr lang="en-TW"/>
+          </a:p>
+        </p:txBody>
+      </p:sp>
+      <p:cxnSp>
+        <p:nvCxnSpPr>
+          <p:cNvPr id="21" name="Straight Arrow Connector 20">
+            <a:extLst>
+              <a:ext uri="{FF2B5EF4-FFF2-40B4-BE49-F238E27FC236}">
+                <a16:creationId xmlns:a16="http://schemas.microsoft.com/office/drawing/2014/main" id="{BE1F091C-0F18-1E20-A979-6D08F42AAC04}"/>
+              </a:ext>
+            </a:extLst>
+          </p:cNvPr>
+          <p:cNvCxnSpPr>
+            <a:cxnSpLocks/>
+          </p:cNvCxnSpPr>
+          <p:nvPr/>
+        </p:nvCxnSpPr>
+        <p:spPr>
+          <a:xfrm>
+            <a:off x="7295578" y="3143623"/>
+            <a:ext cx="269559" cy="0"/>
+          </a:xfrm>
+          <a:prstGeom prst="straightConnector1">
+            <a:avLst/>
+          </a:prstGeom>
+          <a:ln>
+            <a:tailEnd type="triangle"/>
+          </a:ln>
+        </p:spPr>
+        <p:style>
+          <a:lnRef idx="1">
+            <a:schemeClr val="dk1"/>
+          </a:lnRef>
+          <a:fillRef idx="0">
+            <a:schemeClr val="dk1"/>
+          </a:fillRef>
+          <a:effectRef idx="0">
+            <a:schemeClr val="dk1"/>
+          </a:effectRef>
+          <a:fontRef idx="minor">
+            <a:schemeClr val="tx1"/>
+          </a:fontRef>
+        </p:style>
+      </p:cxnSp>
+      <p:cxnSp>
+        <p:nvCxnSpPr>
+          <p:cNvPr id="23" name="Straight Arrow Connector 22">
+            <a:extLst>
+              <a:ext uri="{FF2B5EF4-FFF2-40B4-BE49-F238E27FC236}">
+                <a16:creationId xmlns:a16="http://schemas.microsoft.com/office/drawing/2014/main" id="{E44D387E-DB58-1595-2028-2ADF9748CBFD}"/>
+              </a:ext>
+            </a:extLst>
+          </p:cNvPr>
+          <p:cNvCxnSpPr>
+            <a:cxnSpLocks/>
+          </p:cNvCxnSpPr>
+          <p:nvPr/>
+        </p:nvCxnSpPr>
+        <p:spPr>
+          <a:xfrm flipV="1">
+            <a:off x="6756826" y="4935899"/>
+            <a:ext cx="995696" cy="5194"/>
+          </a:xfrm>
+          <a:prstGeom prst="straightConnector1">
+            <a:avLst/>
+          </a:prstGeom>
+          <a:ln>
+            <a:tailEnd type="triangle"/>
+          </a:ln>
+        </p:spPr>
+        <p:style>
+          <a:lnRef idx="1">
+            <a:schemeClr val="dk1"/>
+          </a:lnRef>
+          <a:fillRef idx="0">
+            <a:schemeClr val="dk1"/>
+          </a:fillRef>
+          <a:effectRef idx="0">
+            <a:schemeClr val="dk1"/>
+          </a:effectRef>
+          <a:fontRef idx="minor">
+            <a:schemeClr val="tx1"/>
+          </a:fontRef>
+        </p:style>
+      </p:cxnSp>
+      <p:cxnSp>
+        <p:nvCxnSpPr>
+          <p:cNvPr id="25" name="Straight Arrow Connector 24">
+            <a:extLst>
+              <a:ext uri="{FF2B5EF4-FFF2-40B4-BE49-F238E27FC236}">
+                <a16:creationId xmlns:a16="http://schemas.microsoft.com/office/drawing/2014/main" id="{86CBEC5B-9110-13F8-F0F2-11296EC38DB3}"/>
+              </a:ext>
+            </a:extLst>
+          </p:cNvPr>
+          <p:cNvCxnSpPr>
+            <a:cxnSpLocks/>
+            <a:stCxn id="16" idx="2"/>
+          </p:cNvCxnSpPr>
+          <p:nvPr/>
+        </p:nvCxnSpPr>
+        <p:spPr>
+          <a:xfrm>
+            <a:off x="8559933" y="3986128"/>
+            <a:ext cx="0" cy="330313"/>
+          </a:xfrm>
+          <a:prstGeom prst="straightConnector1">
+            <a:avLst/>
+          </a:prstGeom>
+          <a:ln>
+            <a:tailEnd type="triangle"/>
+          </a:ln>
+        </p:spPr>
+        <p:style>
+          <a:lnRef idx="1">
+            <a:schemeClr val="dk1"/>
+          </a:lnRef>
+          <a:fillRef idx="0">
+            <a:schemeClr val="dk1"/>
+          </a:fillRef>
+          <a:effectRef idx="0">
+            <a:schemeClr val="dk1"/>
+          </a:effectRef>
+          <a:fontRef idx="minor">
+            <a:schemeClr val="tx1"/>
+          </a:fontRef>
+        </p:style>
+      </p:cxnSp>
+      <p:sp>
+        <p:nvSpPr>
+          <p:cNvPr id="29" name="TextBox 28">
+            <a:extLst>
+              <a:ext uri="{FF2B5EF4-FFF2-40B4-BE49-F238E27FC236}">
+                <a16:creationId xmlns:a16="http://schemas.microsoft.com/office/drawing/2014/main" id="{B84D3985-6A91-0F79-6E4F-7B83DBD4CC0B}"/>
+              </a:ext>
+            </a:extLst>
+          </p:cNvPr>
+          <p:cNvSpPr txBox="1"/>
+          <p:nvPr/>
+        </p:nvSpPr>
+        <p:spPr>
+          <a:xfrm>
+            <a:off x="7752522" y="4486189"/>
+            <a:ext cx="2265080" cy="923330"/>
+          </a:xfrm>
+          <a:prstGeom prst="rect">
+            <a:avLst/>
+          </a:prstGeom>
+          <a:noFill/>
+        </p:spPr>
+        <p:txBody>
+          <a:bodyPr wrap="square">
+            <a:spAutoFit/>
+          </a:bodyPr>
+          <a:lstStyle/>
+          <a:p>
+            <a:r>
+              <a:rPr lang="zh-TW" altLang="en-US" b="0" i="0" dirty="0">
+                <a:effectLst/>
+                <a:latin typeface="Microsoft JhengHei" panose="020B0604030504040204" pitchFamily="34" charset="-120"/>
+                <a:ea typeface="Microsoft JhengHei" panose="020B0604030504040204" pitchFamily="34" charset="-120"/>
+              </a:rPr>
+              <a:t>完整的 </a:t>
+            </a:r>
+            <a:r>
+              <a:rPr lang="en-US" altLang="zh-TW" b="0" i="0" dirty="0">
+                <a:effectLst/>
+                <a:latin typeface="Microsoft JhengHei" panose="020B0604030504040204" pitchFamily="34" charset="-120"/>
+                <a:ea typeface="Microsoft JhengHei" panose="020B0604030504040204" pitchFamily="34" charset="-120"/>
+              </a:rPr>
+              <a:t>Training Set </a:t>
+            </a:r>
+            <a:r>
+              <a:rPr lang="zh-TW" altLang="en-US" b="0" i="0" dirty="0">
+                <a:effectLst/>
+                <a:latin typeface="Microsoft JhengHei" panose="020B0604030504040204" pitchFamily="34" charset="-120"/>
+                <a:ea typeface="Microsoft JhengHei" panose="020B0604030504040204" pitchFamily="34" charset="-120"/>
+              </a:rPr>
+              <a:t>在選出的最佳模型上再訓練一次</a:t>
+            </a:r>
+            <a:endParaRPr lang="en-TW" dirty="0">
+              <a:latin typeface="Microsoft JhengHei" panose="020B0604030504040204" pitchFamily="34" charset="-120"/>
+              <a:ea typeface="Microsoft JhengHei" panose="020B0604030504040204" pitchFamily="34" charset="-120"/>
+            </a:endParaRPr>
+          </a:p>
+        </p:txBody>
+      </p:sp>
+      <p:pic>
+        <p:nvPicPr>
+          <p:cNvPr id="30" name="Picture 8">
+            <a:extLst>
+              <a:ext uri="{FF2B5EF4-FFF2-40B4-BE49-F238E27FC236}">
+                <a16:creationId xmlns:a16="http://schemas.microsoft.com/office/drawing/2014/main" id="{45F4F704-346B-A5B4-BEE0-F31BD2DD7AD1}"/>
+              </a:ext>
+            </a:extLst>
+          </p:cNvPr>
+          <p:cNvPicPr>
+            <a:picLocks noChangeAspect="1" noChangeArrowheads="1"/>
+          </p:cNvPicPr>
+          <p:nvPr/>
+        </p:nvPicPr>
+        <p:blipFill>
+          <a:blip r:embed="rId3">
+            <a:extLst>
+              <a:ext uri="{BEBA8EAE-BF5A-486C-A8C5-ECC9F3942E4B}">
+                <a14:imgProps xmlns:a14="http://schemas.microsoft.com/office/drawing/2010/main">
+                  <a14:imgLayer r:embed="rId4">
+                    <a14:imgEffect>
+                      <a14:brightnessContrast bright="20000" contrast="40000"/>
+                    </a14:imgEffect>
+                  </a14:imgLayer>
+                </a14:imgProps>
+              </a:ext>
+              <a:ext uri="{28A0092B-C50C-407E-A947-70E740481C1C}">
+                <a14:useLocalDpi xmlns:a14="http://schemas.microsoft.com/office/drawing/2010/main" val="0"/>
+              </a:ext>
+            </a:extLst>
+          </a:blip>
+          <a:srcRect/>
+          <a:stretch/>
+        </p:blipFill>
+        <p:spPr bwMode="auto">
+          <a:xfrm>
+            <a:off x="10544059" y="4354432"/>
+            <a:ext cx="1186843" cy="1186843"/>
+          </a:xfrm>
+          <a:prstGeom prst="rect">
+            <a:avLst/>
+          </a:prstGeom>
+          <a:noFill/>
+          <a:extLst>
+            <a:ext uri="{909E8E84-426E-40DD-AFC4-6F175D3DCCD1}">
+              <a14:hiddenFill xmlns:a14="http://schemas.microsoft.com/office/drawing/2010/main">
+                <a:solidFill>
+                  <a:srgbClr val="FFFFFF"/>
+                </a:solidFill>
+              </a14:hiddenFill>
+            </a:ext>
+          </a:extLst>
+        </p:spPr>
+      </p:pic>
+      <p:cxnSp>
+        <p:nvCxnSpPr>
+          <p:cNvPr id="31" name="Straight Arrow Connector 30">
+            <a:extLst>
+              <a:ext uri="{FF2B5EF4-FFF2-40B4-BE49-F238E27FC236}">
+                <a16:creationId xmlns:a16="http://schemas.microsoft.com/office/drawing/2014/main" id="{D8EB6089-761D-F238-4BE3-A09D35056530}"/>
+              </a:ext>
+            </a:extLst>
+          </p:cNvPr>
+          <p:cNvCxnSpPr>
+            <a:cxnSpLocks/>
+            <a:stCxn id="29" idx="3"/>
+            <a:endCxn id="30" idx="1"/>
+          </p:cNvCxnSpPr>
+          <p:nvPr/>
+        </p:nvCxnSpPr>
+        <p:spPr>
+          <a:xfrm>
+            <a:off x="10017602" y="4947854"/>
+            <a:ext cx="526457" cy="0"/>
+          </a:xfrm>
+          <a:prstGeom prst="straightConnector1">
+            <a:avLst/>
+          </a:prstGeom>
+          <a:ln>
+            <a:tailEnd type="triangle"/>
+          </a:ln>
+        </p:spPr>
+        <p:style>
+          <a:lnRef idx="1">
+            <a:schemeClr val="dk1"/>
+          </a:lnRef>
+          <a:fillRef idx="0">
+            <a:schemeClr val="dk1"/>
+          </a:fillRef>
+          <a:effectRef idx="0">
+            <a:schemeClr val="dk1"/>
+          </a:effectRef>
+          <a:fontRef idx="minor">
+            <a:schemeClr val="tx1"/>
+          </a:fontRef>
+        </p:style>
+      </p:cxnSp>
+      <p:sp>
+        <p:nvSpPr>
+          <p:cNvPr id="36" name="TextBox 35">
+            <a:extLst>
+              <a:ext uri="{FF2B5EF4-FFF2-40B4-BE49-F238E27FC236}">
+                <a16:creationId xmlns:a16="http://schemas.microsoft.com/office/drawing/2014/main" id="{1FBF764A-3242-F7AC-4C8D-59D57813391A}"/>
+              </a:ext>
+            </a:extLst>
+          </p:cNvPr>
+          <p:cNvSpPr txBox="1"/>
+          <p:nvPr/>
+        </p:nvSpPr>
+        <p:spPr>
+          <a:xfrm>
+            <a:off x="10544058" y="5384016"/>
+            <a:ext cx="1186843" cy="369332"/>
+          </a:xfrm>
+          <a:prstGeom prst="rect">
+            <a:avLst/>
+          </a:prstGeom>
+          <a:noFill/>
+        </p:spPr>
+        <p:txBody>
+          <a:bodyPr wrap="square">
+            <a:spAutoFit/>
+          </a:bodyPr>
+          <a:lstStyle/>
+          <a:p>
+            <a:pPr algn="ctr"/>
+            <a:r>
+              <a:rPr lang="en-TW" sz="1800" b="1" dirty="0"/>
+              <a:t>最終模型</a:t>
+            </a:r>
+            <a:endParaRPr lang="en-TW" dirty="0"/>
+          </a:p>
+        </p:txBody>
+      </p:sp>
+    </p:spTree>
+    <p:extLst>
+      <p:ext uri="{BB962C8B-B14F-4D97-AF65-F5344CB8AC3E}">
+        <p14:creationId xmlns:p14="http://schemas.microsoft.com/office/powerpoint/2010/main" val="3056215359"/>
+      </p:ext>
+    </p:extLst>
+  </p:cSld>
+  <p:clrMapOvr>
+    <a:masterClrMapping/>
+  </p:clrMapOvr>
+</p:sld>
+</file>
+
+<file path=ppt/slides/slide15.xml><?xml version="1.0" encoding="utf-8"?>
+<p:sld xmlns:a="http://schemas.openxmlformats.org/drawingml/2006/main" xmlns:r="http://schemas.openxmlformats.org/officeDocument/2006/relationships" xmlns:p="http://schemas.openxmlformats.org/presentationml/2006/main">
+  <p:cSld>
+    <p:spTree>
+      <p:nvGrpSpPr>
+        <p:cNvPr id="1" name=""/>
+        <p:cNvGrpSpPr/>
+        <p:nvPr/>
+      </p:nvGrpSpPr>
+      <p:grpSpPr>
+        <a:xfrm>
+          <a:off x="0" y="0"/>
+          <a:ext cx="0" cy="0"/>
+          <a:chOff x="0" y="0"/>
+          <a:chExt cx="0" cy="0"/>
+        </a:xfrm>
+      </p:grpSpPr>
+      <p:sp>
+        <p:nvSpPr>
+          <p:cNvPr id="2" name="Title 1">
+            <a:extLst>
+              <a:ext uri="{FF2B5EF4-FFF2-40B4-BE49-F238E27FC236}">
+                <a16:creationId xmlns:a16="http://schemas.microsoft.com/office/drawing/2014/main" id="{54C0477E-B780-4989-05EE-82412F1EF8B5}"/>
+              </a:ext>
+            </a:extLst>
+          </p:cNvPr>
+          <p:cNvSpPr>
+            <a:spLocks noGrp="1"/>
+          </p:cNvSpPr>
+          <p:nvPr>
+            <p:ph type="title"/>
+          </p:nvPr>
+        </p:nvSpPr>
+        <p:spPr/>
+        <p:txBody>
+          <a:bodyPr/>
+          <a:lstStyle/>
+          <a:p>
+            <a:endParaRPr lang="en-TW"/>
+          </a:p>
+        </p:txBody>
+      </p:sp>
+      <p:graphicFrame>
+        <p:nvGraphicFramePr>
+          <p:cNvPr id="4" name="Table 6">
+            <a:extLst>
+              <a:ext uri="{FF2B5EF4-FFF2-40B4-BE49-F238E27FC236}">
+                <a16:creationId xmlns:a16="http://schemas.microsoft.com/office/drawing/2014/main" id="{A5A1C28C-90A9-BDC6-3C9A-F08C4C8E3A4A}"/>
+              </a:ext>
+            </a:extLst>
+          </p:cNvPr>
+          <p:cNvGraphicFramePr>
+            <a:graphicFrameLocks noGrp="1"/>
+          </p:cNvGraphicFramePr>
+          <p:nvPr>
+            <p:extLst>
+              <p:ext uri="{D42A27DB-BD31-4B8C-83A1-F6EECF244321}">
+                <p14:modId xmlns:p14="http://schemas.microsoft.com/office/powerpoint/2010/main" val="1580983235"/>
+              </p:ext>
+            </p:extLst>
+          </p:nvPr>
+        </p:nvGraphicFramePr>
+        <p:xfrm>
+          <a:off x="3365357" y="2176267"/>
+          <a:ext cx="2255520" cy="370840"/>
+        </p:xfrm>
+        <a:graphic>
+          <a:graphicData uri="http://schemas.openxmlformats.org/drawingml/2006/table">
+            <a:tbl>
+              <a:tblPr firstRow="1" bandRow="1">
+                <a:tableStyleId>{93296810-A885-4BE3-A3E7-6D5BEEA58F35}</a:tableStyleId>
+              </a:tblPr>
+              <a:tblGrid>
+                <a:gridCol w="751840">
+                  <a:extLst>
+                    <a:ext uri="{9D8B030D-6E8A-4147-A177-3AD203B41FA5}">
+                      <a16:colId xmlns:a16="http://schemas.microsoft.com/office/drawing/2014/main" val="2129763124"/>
+                    </a:ext>
+                  </a:extLst>
+                </a:gridCol>
+                <a:gridCol w="751840">
+                  <a:extLst>
+                    <a:ext uri="{9D8B030D-6E8A-4147-A177-3AD203B41FA5}">
+                      <a16:colId xmlns:a16="http://schemas.microsoft.com/office/drawing/2014/main" val="2778580628"/>
+                    </a:ext>
+                  </a:extLst>
+                </a:gridCol>
+                <a:gridCol w="751840">
+                  <a:extLst>
+                    <a:ext uri="{9D8B030D-6E8A-4147-A177-3AD203B41FA5}">
+                      <a16:colId xmlns:a16="http://schemas.microsoft.com/office/drawing/2014/main" val="1543150236"/>
+                    </a:ext>
+                  </a:extLst>
+                </a:gridCol>
+              </a:tblGrid>
+              <a:tr h="370840">
+                <a:tc>
+                  <a:txBody>
+                    <a:bodyPr/>
+                    <a:lstStyle/>
+                    <a:p>
+                      <a:pPr algn="ctr"/>
+                      <a:r>
+                        <a:rPr lang="en-TW" dirty="0"/>
+                        <a:t>D</a:t>
+                      </a:r>
+                      <a:r>
+                        <a:rPr lang="en-TW" baseline="-25000" dirty="0"/>
+                        <a:t>1</a:t>
+                      </a:r>
+                      <a:endParaRPr lang="en-TW" dirty="0"/>
+                    </a:p>
+                  </a:txBody>
+                  <a:tcPr/>
+                </a:tc>
+                <a:tc>
+                  <a:txBody>
+                    <a:bodyPr/>
+                    <a:lstStyle/>
+                    <a:p>
+                      <a:pPr marL="0" marR="0" lvl="0" indent="0" algn="ctr" defTabSz="914400" rtl="0" eaLnBrk="1" fontAlgn="auto" latinLnBrk="0" hangingPunct="1">
+                        <a:lnSpc>
+                          <a:spcPct val="100000"/>
+                        </a:lnSpc>
+                        <a:spcBef>
+                          <a:spcPts val="0"/>
+                        </a:spcBef>
+                        <a:spcAft>
+                          <a:spcPts val="0"/>
+                        </a:spcAft>
+                        <a:buClrTx/>
+                        <a:buSzTx/>
+                        <a:buFontTx/>
+                        <a:buNone/>
+                        <a:tabLst/>
+                        <a:defRPr/>
+                      </a:pPr>
+                      <a:r>
+                        <a:rPr lang="en-TW" dirty="0"/>
+                        <a:t>D</a:t>
+                      </a:r>
+                      <a:r>
+                        <a:rPr lang="en-TW" baseline="-25000" dirty="0"/>
+                        <a:t>2</a:t>
+                      </a:r>
+                      <a:endParaRPr lang="en-TW" dirty="0"/>
+                    </a:p>
+                  </a:txBody>
+                  <a:tcPr/>
+                </a:tc>
+                <a:tc>
+                  <a:txBody>
+                    <a:bodyPr/>
+                    <a:lstStyle/>
+                    <a:p>
+                      <a:pPr marL="0" marR="0" lvl="0" indent="0" algn="ctr" defTabSz="914400" rtl="0" eaLnBrk="1" fontAlgn="auto" latinLnBrk="0" hangingPunct="1">
+                        <a:lnSpc>
+                          <a:spcPct val="100000"/>
+                        </a:lnSpc>
+                        <a:spcBef>
+                          <a:spcPts val="0"/>
+                        </a:spcBef>
+                        <a:spcAft>
+                          <a:spcPts val="0"/>
+                        </a:spcAft>
+                        <a:buClrTx/>
+                        <a:buSzTx/>
+                        <a:buFontTx/>
+                        <a:buNone/>
+                        <a:tabLst/>
+                        <a:defRPr/>
+                      </a:pPr>
+                      <a:r>
+                        <a:rPr lang="en-TW" dirty="0"/>
+                        <a:t>D</a:t>
+                      </a:r>
+                      <a:r>
+                        <a:rPr lang="en-TW" baseline="-25000" dirty="0"/>
+                        <a:t>3</a:t>
+                      </a:r>
+                      <a:endParaRPr lang="en-TW" dirty="0"/>
+                    </a:p>
+                  </a:txBody>
+                  <a:tcPr>
+                    <a:solidFill>
+                      <a:schemeClr val="accent2"/>
+                    </a:solidFill>
+                  </a:tcPr>
+                </a:tc>
+                <a:extLst>
+                  <a:ext uri="{0D108BD9-81ED-4DB2-BD59-A6C34878D82A}">
+                    <a16:rowId xmlns:a16="http://schemas.microsoft.com/office/drawing/2014/main" val="4262553069"/>
+                  </a:ext>
+                </a:extLst>
+              </a:tr>
+            </a:tbl>
+          </a:graphicData>
+        </a:graphic>
+      </p:graphicFrame>
+      <p:graphicFrame>
+        <p:nvGraphicFramePr>
+          <p:cNvPr id="5" name="Table 6">
+            <a:extLst>
+              <a:ext uri="{FF2B5EF4-FFF2-40B4-BE49-F238E27FC236}">
+                <a16:creationId xmlns:a16="http://schemas.microsoft.com/office/drawing/2014/main" id="{EF4F89F0-0760-521D-685F-12CEC66DFF85}"/>
+              </a:ext>
+            </a:extLst>
+          </p:cNvPr>
+          <p:cNvGraphicFramePr>
+            <a:graphicFrameLocks noGrp="1"/>
+          </p:cNvGraphicFramePr>
+          <p:nvPr>
+            <p:extLst>
+              <p:ext uri="{D42A27DB-BD31-4B8C-83A1-F6EECF244321}">
+                <p14:modId xmlns:p14="http://schemas.microsoft.com/office/powerpoint/2010/main" val="2803441006"/>
+              </p:ext>
+            </p:extLst>
+          </p:nvPr>
+        </p:nvGraphicFramePr>
+        <p:xfrm>
+          <a:off x="3365357" y="2722367"/>
+          <a:ext cx="2255520" cy="370840"/>
+        </p:xfrm>
+        <a:graphic>
+          <a:graphicData uri="http://schemas.openxmlformats.org/drawingml/2006/table">
+            <a:tbl>
+              <a:tblPr firstRow="1" bandRow="1">
+                <a:tableStyleId>{93296810-A885-4BE3-A3E7-6D5BEEA58F35}</a:tableStyleId>
+              </a:tblPr>
+              <a:tblGrid>
+                <a:gridCol w="751840">
+                  <a:extLst>
+                    <a:ext uri="{9D8B030D-6E8A-4147-A177-3AD203B41FA5}">
+                      <a16:colId xmlns:a16="http://schemas.microsoft.com/office/drawing/2014/main" val="2129763124"/>
+                    </a:ext>
+                  </a:extLst>
+                </a:gridCol>
+                <a:gridCol w="751840">
+                  <a:extLst>
+                    <a:ext uri="{9D8B030D-6E8A-4147-A177-3AD203B41FA5}">
+                      <a16:colId xmlns:a16="http://schemas.microsoft.com/office/drawing/2014/main" val="2778580628"/>
+                    </a:ext>
+                  </a:extLst>
+                </a:gridCol>
+                <a:gridCol w="751840">
+                  <a:extLst>
+                    <a:ext uri="{9D8B030D-6E8A-4147-A177-3AD203B41FA5}">
+                      <a16:colId xmlns:a16="http://schemas.microsoft.com/office/drawing/2014/main" val="1543150236"/>
+                    </a:ext>
+                  </a:extLst>
+                </a:gridCol>
+              </a:tblGrid>
+              <a:tr h="370840">
+                <a:tc>
+                  <a:txBody>
+                    <a:bodyPr/>
+                    <a:lstStyle/>
+                    <a:p>
+                      <a:pPr algn="ctr"/>
+                      <a:r>
+                        <a:rPr lang="en-TW" dirty="0"/>
+                        <a:t>D</a:t>
+                      </a:r>
+                      <a:r>
+                        <a:rPr lang="en-TW" baseline="-25000" dirty="0"/>
+                        <a:t>1</a:t>
+                      </a:r>
+                      <a:endParaRPr lang="en-TW" dirty="0"/>
+                    </a:p>
+                  </a:txBody>
+                  <a:tcPr/>
+                </a:tc>
+                <a:tc>
+                  <a:txBody>
+                    <a:bodyPr/>
+                    <a:lstStyle/>
+                    <a:p>
+                      <a:pPr marL="0" marR="0" lvl="0" indent="0" algn="ctr" defTabSz="914400" rtl="0" eaLnBrk="1" fontAlgn="auto" latinLnBrk="0" hangingPunct="1">
+                        <a:lnSpc>
+                          <a:spcPct val="100000"/>
+                        </a:lnSpc>
+                        <a:spcBef>
+                          <a:spcPts val="0"/>
+                        </a:spcBef>
+                        <a:spcAft>
+                          <a:spcPts val="0"/>
+                        </a:spcAft>
+                        <a:buClrTx/>
+                        <a:buSzTx/>
+                        <a:buFontTx/>
+                        <a:buNone/>
+                        <a:tabLst/>
+                        <a:defRPr/>
+                      </a:pPr>
+                      <a:r>
+                        <a:rPr lang="en-TW" dirty="0"/>
+                        <a:t>D</a:t>
+                      </a:r>
+                      <a:r>
+                        <a:rPr lang="en-TW" baseline="-25000" dirty="0"/>
+                        <a:t>2</a:t>
+                      </a:r>
+                      <a:endParaRPr lang="en-TW" dirty="0"/>
+                    </a:p>
+                  </a:txBody>
+                  <a:tcPr>
+                    <a:solidFill>
+                      <a:schemeClr val="accent2"/>
+                    </a:solidFill>
+                  </a:tcPr>
+                </a:tc>
+                <a:tc>
+                  <a:txBody>
+                    <a:bodyPr/>
+                    <a:lstStyle/>
+                    <a:p>
+                      <a:pPr marL="0" marR="0" lvl="0" indent="0" algn="ctr" defTabSz="914400" rtl="0" eaLnBrk="1" fontAlgn="auto" latinLnBrk="0" hangingPunct="1">
+                        <a:lnSpc>
+                          <a:spcPct val="100000"/>
+                        </a:lnSpc>
+                        <a:spcBef>
+                          <a:spcPts val="0"/>
+                        </a:spcBef>
+                        <a:spcAft>
+                          <a:spcPts val="0"/>
+                        </a:spcAft>
+                        <a:buClrTx/>
+                        <a:buSzTx/>
+                        <a:buFontTx/>
+                        <a:buNone/>
+                        <a:tabLst/>
+                        <a:defRPr/>
+                      </a:pPr>
+                      <a:r>
+                        <a:rPr lang="en-TW" dirty="0"/>
+                        <a:t>D</a:t>
+                      </a:r>
+                      <a:r>
+                        <a:rPr lang="en-TW" baseline="-25000" dirty="0"/>
+                        <a:t>3</a:t>
+                      </a:r>
+                      <a:endParaRPr lang="en-TW" dirty="0"/>
+                    </a:p>
+                  </a:txBody>
+                  <a:tcPr/>
+                </a:tc>
+                <a:extLst>
+                  <a:ext uri="{0D108BD9-81ED-4DB2-BD59-A6C34878D82A}">
+                    <a16:rowId xmlns:a16="http://schemas.microsoft.com/office/drawing/2014/main" val="4262553069"/>
+                  </a:ext>
+                </a:extLst>
+              </a:tr>
+            </a:tbl>
+          </a:graphicData>
+        </a:graphic>
+      </p:graphicFrame>
+      <p:graphicFrame>
+        <p:nvGraphicFramePr>
+          <p:cNvPr id="6" name="Table 5">
+            <a:extLst>
+              <a:ext uri="{FF2B5EF4-FFF2-40B4-BE49-F238E27FC236}">
+                <a16:creationId xmlns:a16="http://schemas.microsoft.com/office/drawing/2014/main" id="{2A19CABB-4500-6FDB-95A3-87455EE71403}"/>
+              </a:ext>
+            </a:extLst>
+          </p:cNvPr>
+          <p:cNvGraphicFramePr>
+            <a:graphicFrameLocks noGrp="1"/>
+          </p:cNvGraphicFramePr>
+          <p:nvPr>
+            <p:extLst>
+              <p:ext uri="{D42A27DB-BD31-4B8C-83A1-F6EECF244321}">
+                <p14:modId xmlns:p14="http://schemas.microsoft.com/office/powerpoint/2010/main" val="318249179"/>
+              </p:ext>
+            </p:extLst>
+          </p:nvPr>
+        </p:nvGraphicFramePr>
+        <p:xfrm>
+          <a:off x="3365357" y="3268467"/>
+          <a:ext cx="2255520" cy="370840"/>
+        </p:xfrm>
+        <a:graphic>
+          <a:graphicData uri="http://schemas.openxmlformats.org/drawingml/2006/table">
+            <a:tbl>
+              <a:tblPr firstRow="1" bandRow="1">
+                <a:tableStyleId>{93296810-A885-4BE3-A3E7-6D5BEEA58F35}</a:tableStyleId>
+              </a:tblPr>
+              <a:tblGrid>
+                <a:gridCol w="751840">
+                  <a:extLst>
+                    <a:ext uri="{9D8B030D-6E8A-4147-A177-3AD203B41FA5}">
+                      <a16:colId xmlns:a16="http://schemas.microsoft.com/office/drawing/2014/main" val="2129763124"/>
+                    </a:ext>
+                  </a:extLst>
+                </a:gridCol>
+                <a:gridCol w="751840">
+                  <a:extLst>
+                    <a:ext uri="{9D8B030D-6E8A-4147-A177-3AD203B41FA5}">
+                      <a16:colId xmlns:a16="http://schemas.microsoft.com/office/drawing/2014/main" val="2778580628"/>
+                    </a:ext>
+                  </a:extLst>
+                </a:gridCol>
+                <a:gridCol w="751840">
+                  <a:extLst>
+                    <a:ext uri="{9D8B030D-6E8A-4147-A177-3AD203B41FA5}">
+                      <a16:colId xmlns:a16="http://schemas.microsoft.com/office/drawing/2014/main" val="1543150236"/>
+                    </a:ext>
+                  </a:extLst>
+                </a:gridCol>
+              </a:tblGrid>
+              <a:tr h="370840">
+                <a:tc>
+                  <a:txBody>
+                    <a:bodyPr/>
+                    <a:lstStyle/>
+                    <a:p>
+                      <a:pPr algn="ctr"/>
+                      <a:r>
+                        <a:rPr lang="en-TW" dirty="0"/>
+                        <a:t>D</a:t>
+                      </a:r>
+                      <a:r>
+                        <a:rPr lang="en-TW" baseline="-25000" dirty="0"/>
+                        <a:t>1</a:t>
+                      </a:r>
+                      <a:endParaRPr lang="en-TW" dirty="0"/>
+                    </a:p>
+                  </a:txBody>
+                  <a:tcPr>
+                    <a:solidFill>
+                      <a:schemeClr val="accent2"/>
+                    </a:solidFill>
+                  </a:tcPr>
+                </a:tc>
+                <a:tc>
+                  <a:txBody>
+                    <a:bodyPr/>
+                    <a:lstStyle/>
+                    <a:p>
+                      <a:pPr marL="0" marR="0" lvl="0" indent="0" algn="ctr" defTabSz="914400" rtl="0" eaLnBrk="1" fontAlgn="auto" latinLnBrk="0" hangingPunct="1">
+                        <a:lnSpc>
+                          <a:spcPct val="100000"/>
+                        </a:lnSpc>
+                        <a:spcBef>
+                          <a:spcPts val="0"/>
+                        </a:spcBef>
+                        <a:spcAft>
+                          <a:spcPts val="0"/>
+                        </a:spcAft>
+                        <a:buClrTx/>
+                        <a:buSzTx/>
+                        <a:buFontTx/>
+                        <a:buNone/>
+                        <a:tabLst/>
+                        <a:defRPr/>
+                      </a:pPr>
+                      <a:r>
+                        <a:rPr lang="en-TW" dirty="0"/>
+                        <a:t>D</a:t>
+                      </a:r>
+                      <a:r>
+                        <a:rPr lang="en-TW" baseline="-25000" dirty="0"/>
+                        <a:t>2</a:t>
+                      </a:r>
+                      <a:endParaRPr lang="en-TW" dirty="0"/>
+                    </a:p>
+                  </a:txBody>
+                  <a:tcPr/>
+                </a:tc>
+                <a:tc>
+                  <a:txBody>
+                    <a:bodyPr/>
+                    <a:lstStyle/>
+                    <a:p>
+                      <a:pPr marL="0" marR="0" lvl="0" indent="0" algn="ctr" defTabSz="914400" rtl="0" eaLnBrk="1" fontAlgn="auto" latinLnBrk="0" hangingPunct="1">
+                        <a:lnSpc>
+                          <a:spcPct val="100000"/>
+                        </a:lnSpc>
+                        <a:spcBef>
+                          <a:spcPts val="0"/>
+                        </a:spcBef>
+                        <a:spcAft>
+                          <a:spcPts val="0"/>
+                        </a:spcAft>
+                        <a:buClrTx/>
+                        <a:buSzTx/>
+                        <a:buFontTx/>
+                        <a:buNone/>
+                        <a:tabLst/>
+                        <a:defRPr/>
+                      </a:pPr>
+                      <a:r>
+                        <a:rPr lang="en-TW" dirty="0"/>
+                        <a:t>D</a:t>
+                      </a:r>
+                      <a:r>
+                        <a:rPr lang="en-TW" baseline="-25000" dirty="0"/>
+                        <a:t>3</a:t>
+                      </a:r>
+                      <a:endParaRPr lang="en-TW" dirty="0"/>
+                    </a:p>
+                  </a:txBody>
+                  <a:tcPr>
+                    <a:solidFill>
+                      <a:schemeClr val="accent6"/>
+                    </a:solidFill>
+                  </a:tcPr>
+                </a:tc>
+                <a:extLst>
+                  <a:ext uri="{0D108BD9-81ED-4DB2-BD59-A6C34878D82A}">
+                    <a16:rowId xmlns:a16="http://schemas.microsoft.com/office/drawing/2014/main" val="4262553069"/>
+                  </a:ext>
+                </a:extLst>
+              </a:tr>
+            </a:tbl>
+          </a:graphicData>
+        </a:graphic>
+      </p:graphicFrame>
+      <p:sp>
+        <p:nvSpPr>
+          <p:cNvPr id="9" name="Rectangle 8">
+            <a:extLst>
+              <a:ext uri="{FF2B5EF4-FFF2-40B4-BE49-F238E27FC236}">
+                <a16:creationId xmlns:a16="http://schemas.microsoft.com/office/drawing/2014/main" id="{A00F821B-4F3C-86A4-DE35-8A928C9FF382}"/>
+              </a:ext>
+            </a:extLst>
+          </p:cNvPr>
+          <p:cNvSpPr/>
+          <p:nvPr/>
+        </p:nvSpPr>
+        <p:spPr>
+          <a:xfrm>
+            <a:off x="3454257" y="1592067"/>
+            <a:ext cx="165100" cy="165100"/>
+          </a:xfrm>
+          <a:prstGeom prst="rect">
+            <a:avLst/>
+          </a:prstGeom>
+          <a:solidFill>
+            <a:schemeClr val="accent6"/>
+          </a:solidFill>
+          <a:ln>
+            <a:solidFill>
+              <a:schemeClr val="bg1"/>
+            </a:solidFill>
+          </a:ln>
+        </p:spPr>
+        <p:style>
+          <a:lnRef idx="2">
+            <a:schemeClr val="accent1">
+              <a:shade val="50000"/>
+            </a:schemeClr>
+          </a:lnRef>
+          <a:fillRef idx="1">
+            <a:schemeClr val="accent1"/>
+          </a:fillRef>
+          <a:effectRef idx="0">
+            <a:schemeClr val="accent1"/>
+          </a:effectRef>
+          <a:fontRef idx="minor">
+            <a:schemeClr val="lt1"/>
+          </a:fontRef>
+        </p:style>
+        <p:txBody>
+          <a:bodyPr rtlCol="0" anchor="ctr"/>
+          <a:lstStyle/>
+          <a:p>
+            <a:pPr algn="ctr"/>
+            <a:endParaRPr lang="en-TW"/>
+          </a:p>
+        </p:txBody>
+      </p:sp>
+      <p:sp>
+        <p:nvSpPr>
+          <p:cNvPr id="10" name="Rectangle 9">
+            <a:extLst>
+              <a:ext uri="{FF2B5EF4-FFF2-40B4-BE49-F238E27FC236}">
+                <a16:creationId xmlns:a16="http://schemas.microsoft.com/office/drawing/2014/main" id="{D6E9EE82-B2AC-DCF4-BC11-70932D185DA9}"/>
+              </a:ext>
+            </a:extLst>
+          </p:cNvPr>
+          <p:cNvSpPr/>
+          <p:nvPr/>
+        </p:nvSpPr>
+        <p:spPr>
+          <a:xfrm>
+            <a:off x="3454257" y="1807967"/>
+            <a:ext cx="165100" cy="165100"/>
+          </a:xfrm>
+          <a:prstGeom prst="rect">
+            <a:avLst/>
+          </a:prstGeom>
+          <a:solidFill>
+            <a:schemeClr val="accent2"/>
+          </a:solidFill>
+          <a:ln>
+            <a:solidFill>
+              <a:schemeClr val="bg1"/>
+            </a:solidFill>
+          </a:ln>
+        </p:spPr>
+        <p:style>
+          <a:lnRef idx="2">
+            <a:schemeClr val="accent1">
+              <a:shade val="50000"/>
+            </a:schemeClr>
+          </a:lnRef>
+          <a:fillRef idx="1">
+            <a:schemeClr val="accent1"/>
+          </a:fillRef>
+          <a:effectRef idx="0">
+            <a:schemeClr val="accent1"/>
+          </a:effectRef>
+          <a:fontRef idx="minor">
+            <a:schemeClr val="lt1"/>
+          </a:fontRef>
+        </p:style>
+        <p:txBody>
+          <a:bodyPr rtlCol="0" anchor="ctr"/>
+          <a:lstStyle/>
+          <a:p>
+            <a:pPr algn="ctr"/>
+            <a:endParaRPr lang="en-TW"/>
+          </a:p>
+        </p:txBody>
+      </p:sp>
+      <p:sp>
+        <p:nvSpPr>
+          <p:cNvPr id="11" name="Rectangle 10">
+            <a:extLst>
+              <a:ext uri="{FF2B5EF4-FFF2-40B4-BE49-F238E27FC236}">
+                <a16:creationId xmlns:a16="http://schemas.microsoft.com/office/drawing/2014/main" id="{8CF969DD-FD3F-1320-22E0-F481872E31B6}"/>
+              </a:ext>
+            </a:extLst>
+          </p:cNvPr>
+          <p:cNvSpPr/>
+          <p:nvPr/>
+        </p:nvSpPr>
+        <p:spPr>
+          <a:xfrm>
+            <a:off x="3619357" y="1489951"/>
+            <a:ext cx="1301062" cy="369332"/>
+          </a:xfrm>
+          <a:prstGeom prst="rect">
+            <a:avLst/>
+          </a:prstGeom>
+        </p:spPr>
+        <p:txBody>
+          <a:bodyPr wrap="none">
+            <a:spAutoFit/>
+          </a:bodyPr>
+          <a:lstStyle/>
+          <a:p>
+            <a:pPr algn="ctr"/>
+            <a:r>
+              <a:rPr lang="en-TW" b="1" dirty="0">
+                <a:solidFill>
+                  <a:schemeClr val="accent6"/>
+                </a:solidFill>
+              </a:rPr>
+              <a:t>Training Set</a:t>
+            </a:r>
+          </a:p>
+        </p:txBody>
+      </p:sp>
+      <p:sp>
+        <p:nvSpPr>
+          <p:cNvPr id="12" name="Rectangle 11">
+            <a:extLst>
+              <a:ext uri="{FF2B5EF4-FFF2-40B4-BE49-F238E27FC236}">
+                <a16:creationId xmlns:a16="http://schemas.microsoft.com/office/drawing/2014/main" id="{7A9E6DA4-A237-5547-8E36-8BE519FDCEC7}"/>
+              </a:ext>
+            </a:extLst>
+          </p:cNvPr>
+          <p:cNvSpPr/>
+          <p:nvPr/>
+        </p:nvSpPr>
+        <p:spPr>
+          <a:xfrm>
+            <a:off x="3619357" y="1719305"/>
+            <a:ext cx="1207317" cy="369332"/>
+          </a:xfrm>
+          <a:prstGeom prst="rect">
+            <a:avLst/>
+          </a:prstGeom>
+        </p:spPr>
+        <p:txBody>
+          <a:bodyPr wrap="none">
+            <a:spAutoFit/>
+          </a:bodyPr>
+          <a:lstStyle/>
+          <a:p>
+            <a:pPr algn="ctr"/>
+            <a:r>
+              <a:rPr lang="en-TW" b="1" dirty="0">
+                <a:solidFill>
+                  <a:schemeClr val="accent2"/>
+                </a:solidFill>
+              </a:rPr>
+              <a:t>Testing Set</a:t>
+            </a:r>
+          </a:p>
+        </p:txBody>
+      </p:sp>
+      <p:sp>
+        <p:nvSpPr>
+          <p:cNvPr id="13" name="Rectangle 12">
+            <a:extLst>
+              <a:ext uri="{FF2B5EF4-FFF2-40B4-BE49-F238E27FC236}">
+                <a16:creationId xmlns:a16="http://schemas.microsoft.com/office/drawing/2014/main" id="{F9D2964C-B48D-AC14-CDA1-24B43E589B26}"/>
+              </a:ext>
+            </a:extLst>
+          </p:cNvPr>
+          <p:cNvSpPr/>
+          <p:nvPr/>
+        </p:nvSpPr>
+        <p:spPr>
+          <a:xfrm>
+            <a:off x="2047645" y="1693667"/>
+            <a:ext cx="1009828" cy="369332"/>
+          </a:xfrm>
+          <a:prstGeom prst="rect">
+            <a:avLst/>
+          </a:prstGeom>
+        </p:spPr>
+        <p:txBody>
+          <a:bodyPr wrap="none">
+            <a:spAutoFit/>
+          </a:bodyPr>
+          <a:lstStyle/>
+          <a:p>
+            <a:pPr algn="ctr"/>
+            <a:r>
+              <a:rPr lang="en-TW" b="1" dirty="0">
+                <a:solidFill>
+                  <a:schemeClr val="tx1"/>
+                </a:solidFill>
+              </a:rPr>
+              <a:t>Iteration</a:t>
+            </a:r>
+          </a:p>
+        </p:txBody>
+      </p:sp>
+      <p:sp>
+        <p:nvSpPr>
+          <p:cNvPr id="14" name="Rectangle 13">
+            <a:extLst>
+              <a:ext uri="{FF2B5EF4-FFF2-40B4-BE49-F238E27FC236}">
+                <a16:creationId xmlns:a16="http://schemas.microsoft.com/office/drawing/2014/main" id="{AC99F0ED-F4C5-31D2-8085-F28B2BC83FC7}"/>
+              </a:ext>
+            </a:extLst>
+          </p:cNvPr>
+          <p:cNvSpPr/>
+          <p:nvPr/>
+        </p:nvSpPr>
+        <p:spPr>
+          <a:xfrm>
+            <a:off x="2330897" y="2177299"/>
+            <a:ext cx="465064" cy="369332"/>
+          </a:xfrm>
+          <a:prstGeom prst="rect">
+            <a:avLst/>
+          </a:prstGeom>
+        </p:spPr>
+        <p:txBody>
+          <a:bodyPr wrap="none">
+            <a:spAutoFit/>
+          </a:bodyPr>
+          <a:lstStyle/>
+          <a:p>
+            <a:r>
+              <a:rPr lang="en-TW" dirty="0"/>
+              <a:t>1 </a:t>
+            </a:r>
+            <a:r>
+              <a:rPr lang="en-TW" baseline="30000" dirty="0"/>
+              <a:t>st</a:t>
+            </a:r>
+            <a:endParaRPr lang="en-TW" dirty="0"/>
+          </a:p>
+        </p:txBody>
+      </p:sp>
+      <p:sp>
+        <p:nvSpPr>
+          <p:cNvPr id="15" name="Rectangle 14">
+            <a:extLst>
+              <a:ext uri="{FF2B5EF4-FFF2-40B4-BE49-F238E27FC236}">
+                <a16:creationId xmlns:a16="http://schemas.microsoft.com/office/drawing/2014/main" id="{9642A1F9-5E5C-C055-955C-81CDF330A739}"/>
+              </a:ext>
+            </a:extLst>
+          </p:cNvPr>
+          <p:cNvSpPr/>
+          <p:nvPr/>
+        </p:nvSpPr>
+        <p:spPr>
+          <a:xfrm>
+            <a:off x="2305987" y="2723121"/>
+            <a:ext cx="514885" cy="369332"/>
+          </a:xfrm>
+          <a:prstGeom prst="rect">
+            <a:avLst/>
+          </a:prstGeom>
+        </p:spPr>
+        <p:txBody>
+          <a:bodyPr wrap="none">
+            <a:spAutoFit/>
+          </a:bodyPr>
+          <a:lstStyle/>
+          <a:p>
+            <a:r>
+              <a:rPr lang="en-TW" dirty="0"/>
+              <a:t>2 </a:t>
+            </a:r>
+            <a:r>
+              <a:rPr lang="en-TW" baseline="30000" dirty="0"/>
+              <a:t>nd</a:t>
+            </a:r>
+            <a:endParaRPr lang="en-TW" dirty="0"/>
+          </a:p>
+        </p:txBody>
+      </p:sp>
+      <p:sp>
+        <p:nvSpPr>
+          <p:cNvPr id="16" name="Rectangle 15">
+            <a:extLst>
+              <a:ext uri="{FF2B5EF4-FFF2-40B4-BE49-F238E27FC236}">
+                <a16:creationId xmlns:a16="http://schemas.microsoft.com/office/drawing/2014/main" id="{EF891E9E-6793-957B-6369-94B0793820B4}"/>
+              </a:ext>
+            </a:extLst>
+          </p:cNvPr>
+          <p:cNvSpPr/>
+          <p:nvPr/>
+        </p:nvSpPr>
+        <p:spPr>
+          <a:xfrm>
+            <a:off x="2306499" y="3268467"/>
+            <a:ext cx="485518" cy="369332"/>
+          </a:xfrm>
+          <a:prstGeom prst="rect">
+            <a:avLst/>
+          </a:prstGeom>
+        </p:spPr>
+        <p:txBody>
+          <a:bodyPr wrap="none">
+            <a:spAutoFit/>
+          </a:bodyPr>
+          <a:lstStyle/>
+          <a:p>
+            <a:r>
+              <a:rPr lang="en-TW" dirty="0"/>
+              <a:t>3 </a:t>
+            </a:r>
+            <a:r>
+              <a:rPr lang="en-TW" baseline="30000" dirty="0"/>
+              <a:t>rd</a:t>
+            </a:r>
+            <a:endParaRPr lang="en-TW" dirty="0"/>
+          </a:p>
+        </p:txBody>
+      </p:sp>
+      <p:cxnSp>
+        <p:nvCxnSpPr>
+          <p:cNvPr id="19" name="Straight Arrow Connector 18">
+            <a:extLst>
+              <a:ext uri="{FF2B5EF4-FFF2-40B4-BE49-F238E27FC236}">
+                <a16:creationId xmlns:a16="http://schemas.microsoft.com/office/drawing/2014/main" id="{5A52073F-1E5C-1139-4A75-DC44574E0B35}"/>
+              </a:ext>
+            </a:extLst>
+          </p:cNvPr>
+          <p:cNvCxnSpPr/>
+          <p:nvPr/>
+        </p:nvCxnSpPr>
+        <p:spPr>
+          <a:xfrm>
+            <a:off x="5619280" y="2389627"/>
+            <a:ext cx="273054" cy="0"/>
+          </a:xfrm>
+          <a:prstGeom prst="straightConnector1">
+            <a:avLst/>
+          </a:prstGeom>
+          <a:ln>
+            <a:solidFill>
+              <a:srgbClr val="FF2F92"/>
+            </a:solidFill>
+            <a:tailEnd type="triangle"/>
+          </a:ln>
+        </p:spPr>
+        <p:style>
+          <a:lnRef idx="1">
+            <a:schemeClr val="dk1"/>
+          </a:lnRef>
+          <a:fillRef idx="0">
+            <a:schemeClr val="dk1"/>
+          </a:fillRef>
+          <a:effectRef idx="0">
+            <a:schemeClr val="dk1"/>
+          </a:effectRef>
+          <a:fontRef idx="minor">
+            <a:schemeClr val="tx1"/>
+          </a:fontRef>
+        </p:style>
+      </p:cxnSp>
+      <p:cxnSp>
+        <p:nvCxnSpPr>
+          <p:cNvPr id="20" name="Straight Arrow Connector 19">
+            <a:extLst>
+              <a:ext uri="{FF2B5EF4-FFF2-40B4-BE49-F238E27FC236}">
+                <a16:creationId xmlns:a16="http://schemas.microsoft.com/office/drawing/2014/main" id="{AD3A2444-1963-E975-A897-24C20EB821AB}"/>
+              </a:ext>
+            </a:extLst>
+          </p:cNvPr>
+          <p:cNvCxnSpPr/>
+          <p:nvPr/>
+        </p:nvCxnSpPr>
+        <p:spPr>
+          <a:xfrm>
+            <a:off x="5632126" y="2922273"/>
+            <a:ext cx="273054" cy="0"/>
+          </a:xfrm>
+          <a:prstGeom prst="straightConnector1">
+            <a:avLst/>
+          </a:prstGeom>
+          <a:ln>
+            <a:solidFill>
+              <a:srgbClr val="FF2F92"/>
+            </a:solidFill>
+            <a:tailEnd type="triangle"/>
+          </a:ln>
+        </p:spPr>
+        <p:style>
+          <a:lnRef idx="1">
+            <a:schemeClr val="dk1"/>
+          </a:lnRef>
+          <a:fillRef idx="0">
+            <a:schemeClr val="dk1"/>
+          </a:fillRef>
+          <a:effectRef idx="0">
+            <a:schemeClr val="dk1"/>
+          </a:effectRef>
+          <a:fontRef idx="minor">
+            <a:schemeClr val="tx1"/>
+          </a:fontRef>
+        </p:style>
+      </p:cxnSp>
+      <p:cxnSp>
+        <p:nvCxnSpPr>
+          <p:cNvPr id="21" name="Straight Arrow Connector 20">
+            <a:extLst>
+              <a:ext uri="{FF2B5EF4-FFF2-40B4-BE49-F238E27FC236}">
+                <a16:creationId xmlns:a16="http://schemas.microsoft.com/office/drawing/2014/main" id="{3E722D19-CD76-1389-108E-87B176D82ACF}"/>
+              </a:ext>
+            </a:extLst>
+          </p:cNvPr>
+          <p:cNvCxnSpPr/>
+          <p:nvPr/>
+        </p:nvCxnSpPr>
+        <p:spPr>
+          <a:xfrm>
+            <a:off x="5632126" y="3458213"/>
+            <a:ext cx="273054" cy="0"/>
+          </a:xfrm>
+          <a:prstGeom prst="straightConnector1">
+            <a:avLst/>
+          </a:prstGeom>
+          <a:ln>
+            <a:solidFill>
+              <a:srgbClr val="FF2F92"/>
+            </a:solidFill>
+            <a:tailEnd type="triangle"/>
+          </a:ln>
+        </p:spPr>
+        <p:style>
+          <a:lnRef idx="1">
+            <a:schemeClr val="dk1"/>
+          </a:lnRef>
+          <a:fillRef idx="0">
+            <a:schemeClr val="dk1"/>
+          </a:fillRef>
+          <a:effectRef idx="0">
+            <a:schemeClr val="dk1"/>
+          </a:effectRef>
+          <a:fontRef idx="minor">
+            <a:schemeClr val="tx1"/>
+          </a:fontRef>
+        </p:style>
+      </p:cxnSp>
+      <p:sp>
+        <p:nvSpPr>
+          <p:cNvPr id="22" name="Rectangle 21">
+            <a:extLst>
+              <a:ext uri="{FF2B5EF4-FFF2-40B4-BE49-F238E27FC236}">
+                <a16:creationId xmlns:a16="http://schemas.microsoft.com/office/drawing/2014/main" id="{7F88D17C-A308-3339-4ED2-0F4B50BAE834}"/>
+              </a:ext>
+            </a:extLst>
+          </p:cNvPr>
+          <p:cNvSpPr/>
+          <p:nvPr/>
+        </p:nvSpPr>
+        <p:spPr>
+          <a:xfrm>
+            <a:off x="5999268" y="2737607"/>
+            <a:ext cx="617477" cy="369332"/>
+          </a:xfrm>
+          <a:prstGeom prst="rect">
+            <a:avLst/>
+          </a:prstGeom>
+        </p:spPr>
+        <p:txBody>
+          <a:bodyPr wrap="none">
+            <a:spAutoFit/>
+          </a:bodyPr>
+          <a:lstStyle/>
+          <a:p>
+            <a:r>
+              <a:rPr lang="en-TW" dirty="0"/>
+              <a:t>loss</a:t>
+            </a:r>
+            <a:r>
+              <a:rPr lang="en-TW" baseline="-25000" dirty="0"/>
+              <a:t>2</a:t>
+            </a:r>
+            <a:endParaRPr lang="en-TW" dirty="0"/>
+          </a:p>
+        </p:txBody>
+      </p:sp>
+      <p:sp>
+        <p:nvSpPr>
+          <p:cNvPr id="23" name="Rectangle 22">
+            <a:extLst>
+              <a:ext uri="{FF2B5EF4-FFF2-40B4-BE49-F238E27FC236}">
+                <a16:creationId xmlns:a16="http://schemas.microsoft.com/office/drawing/2014/main" id="{D0859979-92B2-5117-676F-0A39CA0B041B}"/>
+              </a:ext>
+            </a:extLst>
+          </p:cNvPr>
+          <p:cNvSpPr/>
+          <p:nvPr/>
+        </p:nvSpPr>
+        <p:spPr>
+          <a:xfrm>
+            <a:off x="5999268" y="3273547"/>
+            <a:ext cx="617477" cy="369332"/>
+          </a:xfrm>
+          <a:prstGeom prst="rect">
+            <a:avLst/>
+          </a:prstGeom>
+        </p:spPr>
+        <p:txBody>
+          <a:bodyPr wrap="none">
+            <a:spAutoFit/>
+          </a:bodyPr>
+          <a:lstStyle/>
+          <a:p>
+            <a:r>
+              <a:rPr lang="en-TW" dirty="0"/>
+              <a:t>loss</a:t>
+            </a:r>
+            <a:r>
+              <a:rPr lang="en-TW" baseline="-25000" dirty="0"/>
+              <a:t>3</a:t>
+            </a:r>
+            <a:endParaRPr lang="en-TW" dirty="0"/>
+          </a:p>
+        </p:txBody>
+      </p:sp>
+      <p:sp>
+        <p:nvSpPr>
+          <p:cNvPr id="24" name="Rectangle 23">
+            <a:extLst>
+              <a:ext uri="{FF2B5EF4-FFF2-40B4-BE49-F238E27FC236}">
+                <a16:creationId xmlns:a16="http://schemas.microsoft.com/office/drawing/2014/main" id="{3F9613B2-FEC2-DD5C-1FA0-154B432DB3BC}"/>
+              </a:ext>
+            </a:extLst>
+          </p:cNvPr>
+          <p:cNvSpPr/>
+          <p:nvPr/>
+        </p:nvSpPr>
+        <p:spPr>
+          <a:xfrm>
+            <a:off x="5999268" y="2176267"/>
+            <a:ext cx="617477" cy="369332"/>
+          </a:xfrm>
+          <a:prstGeom prst="rect">
+            <a:avLst/>
+          </a:prstGeom>
+        </p:spPr>
+        <p:txBody>
+          <a:bodyPr wrap="none">
+            <a:spAutoFit/>
+          </a:bodyPr>
+          <a:lstStyle/>
+          <a:p>
+            <a:r>
+              <a:rPr lang="en-US" dirty="0"/>
+              <a:t>l</a:t>
+            </a:r>
+            <a:r>
+              <a:rPr lang="en-TW" dirty="0"/>
+              <a:t>oss</a:t>
+            </a:r>
+            <a:r>
+              <a:rPr lang="en-TW" baseline="-25000" dirty="0"/>
+              <a:t>1</a:t>
+            </a:r>
+            <a:endParaRPr lang="en-TW" dirty="0"/>
+          </a:p>
+        </p:txBody>
+      </p:sp>
+      <mc:AlternateContent xmlns:mc="http://schemas.openxmlformats.org/markup-compatibility/2006">
+        <mc:Choice xmlns:a14="http://schemas.microsoft.com/office/drawing/2010/main" Requires="a14">
+          <p:sp>
+            <p:nvSpPr>
+              <p:cNvPr id="29" name="Rectangle 28">
+                <a:extLst>
+                  <a:ext uri="{FF2B5EF4-FFF2-40B4-BE49-F238E27FC236}">
+                    <a16:creationId xmlns:a16="http://schemas.microsoft.com/office/drawing/2014/main" id="{296806A1-B94E-1981-209B-BA52F7B6E5B2}"/>
+                  </a:ext>
+                </a:extLst>
+              </p:cNvPr>
+              <p:cNvSpPr/>
+              <p:nvPr/>
+            </p:nvSpPr>
+            <p:spPr>
+              <a:xfrm>
+                <a:off x="6984175" y="2501505"/>
+                <a:ext cx="1995867" cy="875048"/>
+              </a:xfrm>
+              <a:prstGeom prst="rect">
+                <a:avLst/>
+              </a:prstGeom>
+            </p:spPr>
+            <p:txBody>
+              <a:bodyPr wrap="none">
+                <a:spAutoFit/>
+              </a:bodyPr>
+              <a:lstStyle/>
+              <a:p>
+                <a:pPr/>
+                <a14:m>
+                  <m:oMathPara xmlns:m="http://schemas.openxmlformats.org/officeDocument/2006/math">
+                    <m:oMathParaPr>
+                      <m:jc m:val="centerGroup"/>
+                    </m:oMathParaPr>
+                    <m:oMath xmlns:m="http://schemas.openxmlformats.org/officeDocument/2006/math">
+                      <m:r>
+                        <a:rPr lang="en-US" b="0" i="1" smtClean="0">
+                          <a:latin typeface="Cambria Math" panose="02040503050406030204" pitchFamily="18" charset="0"/>
+                        </a:rPr>
+                        <m:t>𝑙𝑜𝑠𝑠</m:t>
+                      </m:r>
+                      <m:r>
+                        <a:rPr lang="en-US" b="0" i="0" smtClean="0">
+                          <a:latin typeface="Cambria Math" panose="02040503050406030204" pitchFamily="18" charset="0"/>
+                        </a:rPr>
+                        <m:t>= </m:t>
+                      </m:r>
+                      <m:f>
+                        <m:fPr>
+                          <m:ctrlPr>
+                            <a:rPr lang="en-US" b="0" i="1" smtClean="0">
+                              <a:latin typeface="Cambria Math" panose="02040503050406030204" pitchFamily="18" charset="0"/>
+                            </a:rPr>
+                          </m:ctrlPr>
+                        </m:fPr>
+                        <m:num>
+                          <m:r>
+                            <a:rPr lang="en-US" b="0" i="1" smtClean="0">
+                              <a:latin typeface="Cambria Math" panose="02040503050406030204" pitchFamily="18" charset="0"/>
+                            </a:rPr>
+                            <m:t>1</m:t>
+                          </m:r>
+                        </m:num>
+                        <m:den>
+                          <m:r>
+                            <a:rPr lang="en-US" b="0" i="1" smtClean="0">
+                              <a:latin typeface="Cambria Math" panose="02040503050406030204" pitchFamily="18" charset="0"/>
+                            </a:rPr>
+                            <m:t>3</m:t>
+                          </m:r>
+                        </m:den>
+                      </m:f>
+                      <m:nary>
+                        <m:naryPr>
+                          <m:chr m:val="∑"/>
+                          <m:ctrlPr>
+                            <a:rPr lang="en-US" b="0" i="1" smtClean="0">
+                              <a:latin typeface="Cambria Math" panose="02040503050406030204" pitchFamily="18" charset="0"/>
+                            </a:rPr>
+                          </m:ctrlPr>
+                        </m:naryPr>
+                        <m:sub>
+                          <m:r>
+                            <m:rPr>
+                              <m:brk m:alnAt="23"/>
+                            </m:rPr>
+                            <a:rPr lang="en-US" b="0" i="1" smtClean="0">
+                              <a:latin typeface="Cambria Math" panose="02040503050406030204" pitchFamily="18" charset="0"/>
+                            </a:rPr>
+                            <m:t>𝑖</m:t>
+                          </m:r>
+                          <m:r>
+                            <a:rPr lang="en-US" b="0" i="1" smtClean="0">
+                              <a:latin typeface="Cambria Math" panose="02040503050406030204" pitchFamily="18" charset="0"/>
+                            </a:rPr>
+                            <m:t>=1</m:t>
+                          </m:r>
+                        </m:sub>
+                        <m:sup>
+                          <m:r>
+                            <a:rPr lang="en-US" b="0" i="1" smtClean="0">
+                              <a:latin typeface="Cambria Math" panose="02040503050406030204" pitchFamily="18" charset="0"/>
+                            </a:rPr>
+                            <m:t>3</m:t>
+                          </m:r>
+                        </m:sup>
+                        <m:e>
+                          <m:sSub>
+                            <m:sSubPr>
+                              <m:ctrlPr>
+                                <a:rPr lang="en-US" b="0" i="1" smtClean="0">
+                                  <a:latin typeface="Cambria Math" panose="02040503050406030204" pitchFamily="18" charset="0"/>
+                                </a:rPr>
+                              </m:ctrlPr>
+                            </m:sSubPr>
+                            <m:e>
+                              <m:r>
+                                <a:rPr lang="en-US" b="0" i="1" smtClean="0">
+                                  <a:latin typeface="Cambria Math" panose="02040503050406030204" pitchFamily="18" charset="0"/>
+                                </a:rPr>
+                                <m:t>𝑙𝑜𝑠𝑠</m:t>
+                              </m:r>
+                            </m:e>
+                            <m:sub>
+                              <m:r>
+                                <a:rPr lang="en-US" b="0" i="1" smtClean="0">
+                                  <a:latin typeface="Cambria Math" panose="02040503050406030204" pitchFamily="18" charset="0"/>
+                                </a:rPr>
+                                <m:t>𝑖</m:t>
+                              </m:r>
+                            </m:sub>
+                          </m:sSub>
+                        </m:e>
+                      </m:nary>
+                    </m:oMath>
+                  </m:oMathPara>
+                </a14:m>
+                <a:endParaRPr lang="en-TW" dirty="0"/>
+              </a:p>
+            </p:txBody>
+          </p:sp>
+        </mc:Choice>
+        <mc:Fallback>
+          <p:sp>
+            <p:nvSpPr>
+              <p:cNvPr id="29" name="Rectangle 28">
+                <a:extLst>
+                  <a:ext uri="{FF2B5EF4-FFF2-40B4-BE49-F238E27FC236}">
+                    <a16:creationId xmlns:a16="http://schemas.microsoft.com/office/drawing/2014/main" id="{296806A1-B94E-1981-209B-BA52F7B6E5B2}"/>
+                  </a:ext>
+                </a:extLst>
+              </p:cNvPr>
+              <p:cNvSpPr>
+                <a:spLocks noRot="1" noChangeAspect="1" noMove="1" noResize="1" noEditPoints="1" noAdjustHandles="1" noChangeArrowheads="1" noChangeShapeType="1" noTextEdit="1"/>
+              </p:cNvSpPr>
+              <p:nvPr/>
+            </p:nvSpPr>
+            <p:spPr>
+              <a:xfrm>
+                <a:off x="6984175" y="2501505"/>
+                <a:ext cx="1995867" cy="875048"/>
+              </a:xfrm>
+              <a:prstGeom prst="rect">
+                <a:avLst/>
+              </a:prstGeom>
+              <a:blipFill>
+                <a:blip r:embed="rId2"/>
+                <a:stretch>
+                  <a:fillRect t="-92857" b="-148571"/>
+                </a:stretch>
+              </a:blipFill>
+            </p:spPr>
+            <p:txBody>
+              <a:bodyPr/>
+              <a:lstStyle/>
+              <a:p>
+                <a:r>
+                  <a:rPr lang="en-TW">
+                    <a:noFill/>
+                  </a:rPr>
+                  <a:t> </a:t>
+                </a:r>
+              </a:p>
+            </p:txBody>
+          </p:sp>
+        </mc:Fallback>
+      </mc:AlternateContent>
+      <p:sp>
+        <p:nvSpPr>
+          <p:cNvPr id="30" name="Right Brace 29">
+            <a:extLst>
+              <a:ext uri="{FF2B5EF4-FFF2-40B4-BE49-F238E27FC236}">
+                <a16:creationId xmlns:a16="http://schemas.microsoft.com/office/drawing/2014/main" id="{24F6D93F-AA32-2E69-AFBF-B768F396A4F0}"/>
+              </a:ext>
+            </a:extLst>
+          </p:cNvPr>
+          <p:cNvSpPr/>
+          <p:nvPr/>
+        </p:nvSpPr>
+        <p:spPr>
+          <a:xfrm>
+            <a:off x="6709789" y="2440427"/>
+            <a:ext cx="181342" cy="1017786"/>
+          </a:xfrm>
+          <a:prstGeom prst="rightBrace">
+            <a:avLst/>
+          </a:prstGeom>
+          <a:ln>
+            <a:solidFill>
+              <a:srgbClr val="FF2F92"/>
+            </a:solidFill>
+          </a:ln>
+        </p:spPr>
+        <p:style>
+          <a:lnRef idx="1">
+            <a:schemeClr val="accent1"/>
+          </a:lnRef>
+          <a:fillRef idx="0">
+            <a:schemeClr val="accent1"/>
+          </a:fillRef>
+          <a:effectRef idx="0">
+            <a:schemeClr val="accent1"/>
+          </a:effectRef>
+          <a:fontRef idx="minor">
+            <a:schemeClr val="tx1"/>
+          </a:fontRef>
+        </p:style>
+        <p:txBody>
+          <a:bodyPr rtlCol="0" anchor="ctr"/>
+          <a:lstStyle/>
+          <a:p>
+            <a:pPr algn="ctr"/>
+            <a:endParaRPr lang="en-TW"/>
+          </a:p>
+        </p:txBody>
+      </p:sp>
+    </p:spTree>
+    <p:extLst>
+      <p:ext uri="{BB962C8B-B14F-4D97-AF65-F5344CB8AC3E}">
+        <p14:creationId xmlns:p14="http://schemas.microsoft.com/office/powerpoint/2010/main" val="460894229"/>
+      </p:ext>
+    </p:extLst>
+  </p:cSld>
+  <p:clrMapOvr>
+    <a:masterClrMapping/>
+  </p:clrMapOvr>
+</p:sld>
+</file>
+
+<file path=ppt/slides/slide16.xml><?xml version="1.0" encoding="utf-8"?>
+<p:sld xmlns:a="http://schemas.openxmlformats.org/drawingml/2006/main" xmlns:r="http://schemas.openxmlformats.org/officeDocument/2006/relationships" xmlns:p="http://schemas.openxmlformats.org/presentationml/2006/main">
+  <p:cSld>
+    <p:spTree>
+      <p:nvGrpSpPr>
+        <p:cNvPr id="1" name=""/>
+        <p:cNvGrpSpPr/>
+        <p:nvPr/>
+      </p:nvGrpSpPr>
+      <p:grpSpPr>
+        <a:xfrm>
+          <a:off x="0" y="0"/>
+          <a:ext cx="0" cy="0"/>
+          <a:chOff x="0" y="0"/>
+          <a:chExt cx="0" cy="0"/>
+        </a:xfrm>
+      </p:grpSpPr>
+      <p:sp>
+        <p:nvSpPr>
+          <p:cNvPr id="2" name="Title 1">
+            <a:extLst>
+              <a:ext uri="{FF2B5EF4-FFF2-40B4-BE49-F238E27FC236}">
                 <a16:creationId xmlns:a16="http://schemas.microsoft.com/office/drawing/2014/main" id="{D3857A16-6DFD-4F47-9BC1-8D3CAF0ECD93}"/>
               </a:ext>
             </a:extLst>
@@ -6396,7 +8855,7 @@
 </p:sld>
 </file>
 
-<file path=ppt/slides/slide14.xml><?xml version="1.0" encoding="utf-8"?>
+<file path=ppt/slides/slide17.xml><?xml version="1.0" encoding="utf-8"?>
 <p:sld xmlns:a="http://schemas.openxmlformats.org/drawingml/2006/main" xmlns:r="http://schemas.openxmlformats.org/officeDocument/2006/relationships" xmlns:p="http://schemas.openxmlformats.org/presentationml/2006/main">
   <p:cSld>
     <p:spTree>

</xml_diff>